<commit_message>
docs : git rebase 문서 보강
- git rebase 문서 보강
</commit_message>
<xml_diff>
--- a/docs/9. rebase.pptx
+++ b/docs/9. rebase.pptx
@@ -5,7 +5,7 @@
     <p:sldMasterId id="2147483648" r:id="rId1"/>
   </p:sldMasterIdLst>
   <p:notesMasterIdLst>
-    <p:notesMasterId r:id="rId23"/>
+    <p:notesMasterId r:id="rId25"/>
   </p:notesMasterIdLst>
   <p:sldIdLst>
     <p:sldId id="257" r:id="rId2"/>
@@ -26,9 +26,11 @@
     <p:sldId id="378" r:id="rId17"/>
     <p:sldId id="379" r:id="rId18"/>
     <p:sldId id="380" r:id="rId19"/>
-    <p:sldId id="381" r:id="rId20"/>
-    <p:sldId id="260" r:id="rId21"/>
-    <p:sldId id="262" r:id="rId22"/>
+    <p:sldId id="382" r:id="rId20"/>
+    <p:sldId id="381" r:id="rId21"/>
+    <p:sldId id="383" r:id="rId22"/>
+    <p:sldId id="260" r:id="rId23"/>
+    <p:sldId id="262" r:id="rId24"/>
   </p:sldIdLst>
   <p:sldSz cx="12192000" cy="6858000"/>
   <p:notesSz cx="6858000" cy="9144000"/>
@@ -1468,7 +1470,7 @@
           <a:p>
             <a:fld id="{EFBA5509-D1D1-47CF-BFB7-E1AA9548D41D}" type="datetimeFigureOut">
               <a:rPr lang="ko-KR" altLang="en-US" smtClean="0"/>
-              <a:t>2023-01-04</a:t>
+              <a:t>2023-01-05</a:t>
             </a:fld>
             <a:endParaRPr lang="ko-KR" altLang="en-US"/>
           </a:p>
@@ -2229,6 +2231,90 @@
     </p:spTree>
     <p:extLst>
       <p:ext uri="{BB962C8B-B14F-4D97-AF65-F5344CB8AC3E}">
+        <p14:creationId xmlns:p14="http://schemas.microsoft.com/office/powerpoint/2010/main" val="1205416027"/>
+      </p:ext>
+    </p:extLst>
+  </p:cSld>
+  <p:clrMapOvr>
+    <a:masterClrMapping/>
+  </p:clrMapOvr>
+</p:notes>
+</file>
+
+<file path=ppt/notesSlides/notesSlide15.xml><?xml version="1.0" encoding="utf-8"?>
+<p:notes xmlns:a="http://schemas.openxmlformats.org/drawingml/2006/main" xmlns:r="http://schemas.openxmlformats.org/officeDocument/2006/relationships" xmlns:p="http://schemas.openxmlformats.org/presentationml/2006/main">
+  <p:cSld>
+    <p:spTree>
+      <p:nvGrpSpPr>
+        <p:cNvPr id="1" name=""/>
+        <p:cNvGrpSpPr/>
+        <p:nvPr/>
+      </p:nvGrpSpPr>
+      <p:grpSpPr>
+        <a:xfrm>
+          <a:off x="0" y="0"/>
+          <a:ext cx="0" cy="0"/>
+          <a:chOff x="0" y="0"/>
+          <a:chExt cx="0" cy="0"/>
+        </a:xfrm>
+      </p:grpSpPr>
+      <p:sp>
+        <p:nvSpPr>
+          <p:cNvPr id="2" name="슬라이드 이미지 개체 틀 1"/>
+          <p:cNvSpPr>
+            <a:spLocks noGrp="1" noRot="1" noChangeAspect="1"/>
+          </p:cNvSpPr>
+          <p:nvPr>
+            <p:ph type="sldImg"/>
+          </p:nvPr>
+        </p:nvSpPr>
+        <p:spPr/>
+      </p:sp>
+      <p:sp>
+        <p:nvSpPr>
+          <p:cNvPr id="3" name="슬라이드 노트 개체 틀 2"/>
+          <p:cNvSpPr>
+            <a:spLocks noGrp="1"/>
+          </p:cNvSpPr>
+          <p:nvPr>
+            <p:ph type="body" idx="1"/>
+          </p:nvPr>
+        </p:nvSpPr>
+        <p:spPr/>
+        <p:txBody>
+          <a:bodyPr/>
+          <a:lstStyle/>
+          <a:p>
+            <a:endParaRPr lang="ko-KR" altLang="en-US" dirty="0"/>
+          </a:p>
+        </p:txBody>
+      </p:sp>
+      <p:sp>
+        <p:nvSpPr>
+          <p:cNvPr id="4" name="슬라이드 번호 개체 틀 3"/>
+          <p:cNvSpPr>
+            <a:spLocks noGrp="1"/>
+          </p:cNvSpPr>
+          <p:nvPr>
+            <p:ph type="sldNum" sz="quarter" idx="5"/>
+          </p:nvPr>
+        </p:nvSpPr>
+        <p:spPr/>
+        <p:txBody>
+          <a:bodyPr/>
+          <a:lstStyle/>
+          <a:p>
+            <a:fld id="{145D4F75-7E5F-419D-AB03-9C193CB4F170}" type="slidenum">
+              <a:rPr lang="ko-KR" altLang="en-US" smtClean="0"/>
+              <a:t>20</a:t>
+            </a:fld>
+            <a:endParaRPr lang="ko-KR" altLang="en-US"/>
+          </a:p>
+        </p:txBody>
+      </p:sp>
+    </p:spTree>
+    <p:extLst>
+      <p:ext uri="{BB962C8B-B14F-4D97-AF65-F5344CB8AC3E}">
         <p14:creationId xmlns:p14="http://schemas.microsoft.com/office/powerpoint/2010/main" val="3299679086"/>
       </p:ext>
     </p:extLst>
@@ -3058,7 +3144,7 @@
           <a:p>
             <a:fld id="{2E2D5BC7-3CC9-4CF8-9043-E85E9F2EC4FF}" type="datetimeFigureOut">
               <a:rPr lang="ko-KR" altLang="en-US" smtClean="0"/>
-              <a:t>2023-01-04</a:t>
+              <a:t>2023-01-05</a:t>
             </a:fld>
             <a:endParaRPr lang="ko-KR" altLang="en-US"/>
           </a:p>
@@ -3256,7 +3342,7 @@
           <a:p>
             <a:fld id="{2E2D5BC7-3CC9-4CF8-9043-E85E9F2EC4FF}" type="datetimeFigureOut">
               <a:rPr lang="ko-KR" altLang="en-US" smtClean="0"/>
-              <a:t>2023-01-04</a:t>
+              <a:t>2023-01-05</a:t>
             </a:fld>
             <a:endParaRPr lang="ko-KR" altLang="en-US"/>
           </a:p>
@@ -3464,7 +3550,7 @@
           <a:p>
             <a:fld id="{2E2D5BC7-3CC9-4CF8-9043-E85E9F2EC4FF}" type="datetimeFigureOut">
               <a:rPr lang="ko-KR" altLang="en-US" smtClean="0"/>
-              <a:t>2023-01-04</a:t>
+              <a:t>2023-01-05</a:t>
             </a:fld>
             <a:endParaRPr lang="ko-KR" altLang="en-US"/>
           </a:p>
@@ -3662,7 +3748,7 @@
           <a:p>
             <a:fld id="{2E2D5BC7-3CC9-4CF8-9043-E85E9F2EC4FF}" type="datetimeFigureOut">
               <a:rPr lang="ko-KR" altLang="en-US" smtClean="0"/>
-              <a:t>2023-01-04</a:t>
+              <a:t>2023-01-05</a:t>
             </a:fld>
             <a:endParaRPr lang="ko-KR" altLang="en-US"/>
           </a:p>
@@ -3937,7 +4023,7 @@
           <a:p>
             <a:fld id="{2E2D5BC7-3CC9-4CF8-9043-E85E9F2EC4FF}" type="datetimeFigureOut">
               <a:rPr lang="ko-KR" altLang="en-US" smtClean="0"/>
-              <a:t>2023-01-04</a:t>
+              <a:t>2023-01-05</a:t>
             </a:fld>
             <a:endParaRPr lang="ko-KR" altLang="en-US"/>
           </a:p>
@@ -4202,7 +4288,7 @@
           <a:p>
             <a:fld id="{2E2D5BC7-3CC9-4CF8-9043-E85E9F2EC4FF}" type="datetimeFigureOut">
               <a:rPr lang="ko-KR" altLang="en-US" smtClean="0"/>
-              <a:t>2023-01-04</a:t>
+              <a:t>2023-01-05</a:t>
             </a:fld>
             <a:endParaRPr lang="ko-KR" altLang="en-US"/>
           </a:p>
@@ -4614,7 +4700,7 @@
           <a:p>
             <a:fld id="{2E2D5BC7-3CC9-4CF8-9043-E85E9F2EC4FF}" type="datetimeFigureOut">
               <a:rPr lang="ko-KR" altLang="en-US" smtClean="0"/>
-              <a:t>2023-01-04</a:t>
+              <a:t>2023-01-05</a:t>
             </a:fld>
             <a:endParaRPr lang="ko-KR" altLang="en-US"/>
           </a:p>
@@ -4755,7 +4841,7 @@
           <a:p>
             <a:fld id="{2E2D5BC7-3CC9-4CF8-9043-E85E9F2EC4FF}" type="datetimeFigureOut">
               <a:rPr lang="ko-KR" altLang="en-US" smtClean="0"/>
-              <a:t>2023-01-04</a:t>
+              <a:t>2023-01-05</a:t>
             </a:fld>
             <a:endParaRPr lang="ko-KR" altLang="en-US"/>
           </a:p>
@@ -4868,7 +4954,7 @@
           <a:p>
             <a:fld id="{2E2D5BC7-3CC9-4CF8-9043-E85E9F2EC4FF}" type="datetimeFigureOut">
               <a:rPr lang="ko-KR" altLang="en-US" smtClean="0"/>
-              <a:t>2023-01-04</a:t>
+              <a:t>2023-01-05</a:t>
             </a:fld>
             <a:endParaRPr lang="ko-KR" altLang="en-US"/>
           </a:p>
@@ -5179,7 +5265,7 @@
           <a:p>
             <a:fld id="{2E2D5BC7-3CC9-4CF8-9043-E85E9F2EC4FF}" type="datetimeFigureOut">
               <a:rPr lang="ko-KR" altLang="en-US" smtClean="0"/>
-              <a:t>2023-01-04</a:t>
+              <a:t>2023-01-05</a:t>
             </a:fld>
             <a:endParaRPr lang="ko-KR" altLang="en-US"/>
           </a:p>
@@ -5467,7 +5553,7 @@
           <a:p>
             <a:fld id="{2E2D5BC7-3CC9-4CF8-9043-E85E9F2EC4FF}" type="datetimeFigureOut">
               <a:rPr lang="ko-KR" altLang="en-US" smtClean="0"/>
-              <a:t>2023-01-04</a:t>
+              <a:t>2023-01-05</a:t>
             </a:fld>
             <a:endParaRPr lang="ko-KR" altLang="en-US"/>
           </a:p>
@@ -5708,7 +5794,7 @@
           <a:p>
             <a:fld id="{2E2D5BC7-3CC9-4CF8-9043-E85E9F2EC4FF}" type="datetimeFigureOut">
               <a:rPr lang="ko-KR" altLang="en-US" smtClean="0"/>
-              <a:t>2023-01-04</a:t>
+              <a:t>2023-01-05</a:t>
             </a:fld>
             <a:endParaRPr lang="ko-KR" altLang="en-US"/>
           </a:p>
@@ -7424,582 +7510,561 @@
           </a:p>
         </p:txBody>
       </p:sp>
-      <p:grpSp>
-        <p:nvGrpSpPr>
-          <p:cNvPr id="10" name="그룹 9">
+      <p:sp>
+        <p:nvSpPr>
+          <p:cNvPr id="11" name="타원 10">
             <a:extLst>
               <a:ext uri="{FF2B5EF4-FFF2-40B4-BE49-F238E27FC236}">
-                <a16:creationId xmlns:a16="http://schemas.microsoft.com/office/drawing/2014/main" id="{1A43844E-ABFC-689B-3965-DFC9C3865D62}"/>
+                <a16:creationId xmlns:a16="http://schemas.microsoft.com/office/drawing/2014/main" id="{C523108A-67E6-635F-8B06-68E32375F7E1}"/>
               </a:ext>
             </a:extLst>
           </p:cNvPr>
-          <p:cNvGrpSpPr/>
+          <p:cNvSpPr/>
           <p:nvPr/>
-        </p:nvGrpSpPr>
-        <p:grpSpPr>
+        </p:nvSpPr>
+        <p:spPr>
           <a:xfrm>
-            <a:off x="1006794" y="1440600"/>
-            <a:ext cx="10178413" cy="3455693"/>
-            <a:chOff x="641117" y="1440600"/>
-            <a:chExt cx="10178413" cy="3455693"/>
+            <a:off x="1006794" y="3503428"/>
+            <a:ext cx="1392865" cy="1392865"/>
           </a:xfrm>
-        </p:grpSpPr>
-        <p:sp>
-          <p:nvSpPr>
-            <p:cNvPr id="11" name="타원 10">
-              <a:extLst>
-                <a:ext uri="{FF2B5EF4-FFF2-40B4-BE49-F238E27FC236}">
-                  <a16:creationId xmlns:a16="http://schemas.microsoft.com/office/drawing/2014/main" id="{C523108A-67E6-635F-8B06-68E32375F7E1}"/>
-                </a:ext>
-              </a:extLst>
-            </p:cNvPr>
-            <p:cNvSpPr/>
-            <p:nvPr/>
-          </p:nvSpPr>
-          <p:spPr>
-            <a:xfrm>
-              <a:off x="641117" y="3503428"/>
-              <a:ext cx="1392865" cy="1392865"/>
-            </a:xfrm>
-            <a:prstGeom prst="ellipse">
-              <a:avLst/>
-            </a:prstGeom>
+          <a:prstGeom prst="ellipse">
+            <a:avLst/>
+          </a:prstGeom>
+          <a:solidFill>
+            <a:schemeClr val="accent2"/>
+          </a:solidFill>
+          <a:ln>
+            <a:noFill/>
+          </a:ln>
+        </p:spPr>
+        <p:style>
+          <a:lnRef idx="2">
+            <a:schemeClr val="accent1">
+              <a:shade val="50000"/>
+            </a:schemeClr>
+          </a:lnRef>
+          <a:fillRef idx="1">
+            <a:schemeClr val="accent1"/>
+          </a:fillRef>
+          <a:effectRef idx="0">
+            <a:schemeClr val="accent1"/>
+          </a:effectRef>
+          <a:fontRef idx="minor">
+            <a:schemeClr val="lt1"/>
+          </a:fontRef>
+        </p:style>
+        <p:txBody>
+          <a:bodyPr rtlCol="0" anchor="ctr"/>
+          <a:lstStyle/>
+          <a:p>
+            <a:pPr algn="ctr"/>
+            <a:r>
+              <a:rPr lang="en-US" altLang="ko-KR" dirty="0"/>
+              <a:t>c0</a:t>
+            </a:r>
+            <a:endParaRPr lang="ko-KR" altLang="en-US" dirty="0"/>
+          </a:p>
+        </p:txBody>
+      </p:sp>
+      <p:sp>
+        <p:nvSpPr>
+          <p:cNvPr id="12" name="타원 11">
+            <a:extLst>
+              <a:ext uri="{FF2B5EF4-FFF2-40B4-BE49-F238E27FC236}">
+                <a16:creationId xmlns:a16="http://schemas.microsoft.com/office/drawing/2014/main" id="{01CB9947-7B37-E3C8-7559-EB2CB753EC48}"/>
+              </a:ext>
+            </a:extLst>
+          </p:cNvPr>
+          <p:cNvSpPr/>
+          <p:nvPr/>
+        </p:nvSpPr>
+        <p:spPr>
+          <a:xfrm>
+            <a:off x="3193304" y="3503428"/>
+            <a:ext cx="1392865" cy="1392865"/>
+          </a:xfrm>
+          <a:prstGeom prst="ellipse">
+            <a:avLst/>
+          </a:prstGeom>
+          <a:solidFill>
+            <a:schemeClr val="accent2"/>
+          </a:solidFill>
+          <a:ln>
+            <a:noFill/>
+          </a:ln>
+        </p:spPr>
+        <p:style>
+          <a:lnRef idx="2">
+            <a:schemeClr val="accent1">
+              <a:shade val="50000"/>
+            </a:schemeClr>
+          </a:lnRef>
+          <a:fillRef idx="1">
+            <a:schemeClr val="accent1"/>
+          </a:fillRef>
+          <a:effectRef idx="0">
+            <a:schemeClr val="accent1"/>
+          </a:effectRef>
+          <a:fontRef idx="minor">
+            <a:schemeClr val="lt1"/>
+          </a:fontRef>
+        </p:style>
+        <p:txBody>
+          <a:bodyPr rtlCol="0" anchor="ctr"/>
+          <a:lstStyle/>
+          <a:p>
+            <a:pPr algn="ctr"/>
+            <a:r>
+              <a:rPr lang="en-US" altLang="ko-KR" dirty="0"/>
+              <a:t>c1</a:t>
+            </a:r>
+            <a:endParaRPr lang="ko-KR" altLang="en-US" dirty="0"/>
+          </a:p>
+        </p:txBody>
+      </p:sp>
+      <p:sp>
+        <p:nvSpPr>
+          <p:cNvPr id="13" name="타원 12">
+            <a:extLst>
+              <a:ext uri="{FF2B5EF4-FFF2-40B4-BE49-F238E27FC236}">
+                <a16:creationId xmlns:a16="http://schemas.microsoft.com/office/drawing/2014/main" id="{9345E8B3-B823-0FF7-E412-00719B76822C}"/>
+              </a:ext>
+            </a:extLst>
+          </p:cNvPr>
+          <p:cNvSpPr/>
+          <p:nvPr/>
+        </p:nvSpPr>
+        <p:spPr>
+          <a:xfrm>
+            <a:off x="7767278" y="1973482"/>
+            <a:ext cx="1392865" cy="1392865"/>
+          </a:xfrm>
+          <a:prstGeom prst="ellipse">
+            <a:avLst/>
+          </a:prstGeom>
+          <a:solidFill>
+            <a:schemeClr val="accent2">
+              <a:alpha val="35000"/>
+            </a:schemeClr>
+          </a:solidFill>
+          <a:ln>
+            <a:noFill/>
+          </a:ln>
+        </p:spPr>
+        <p:style>
+          <a:lnRef idx="2">
+            <a:schemeClr val="accent1">
+              <a:shade val="50000"/>
+            </a:schemeClr>
+          </a:lnRef>
+          <a:fillRef idx="1">
+            <a:schemeClr val="accent1"/>
+          </a:fillRef>
+          <a:effectRef idx="0">
+            <a:schemeClr val="accent1"/>
+          </a:effectRef>
+          <a:fontRef idx="minor">
+            <a:schemeClr val="lt1"/>
+          </a:fontRef>
+        </p:style>
+        <p:txBody>
+          <a:bodyPr rtlCol="0" anchor="ctr"/>
+          <a:lstStyle/>
+          <a:p>
+            <a:pPr algn="ctr"/>
+            <a:r>
+              <a:rPr lang="en-US" altLang="ko-KR" dirty="0"/>
+              <a:t>c3</a:t>
+            </a:r>
+            <a:endParaRPr lang="ko-KR" altLang="en-US" dirty="0"/>
+          </a:p>
+        </p:txBody>
+      </p:sp>
+      <p:sp>
+        <p:nvSpPr>
+          <p:cNvPr id="14" name="타원 13">
+            <a:extLst>
+              <a:ext uri="{FF2B5EF4-FFF2-40B4-BE49-F238E27FC236}">
+                <a16:creationId xmlns:a16="http://schemas.microsoft.com/office/drawing/2014/main" id="{88C94E82-9482-313B-62CC-1338AFBF7227}"/>
+              </a:ext>
+            </a:extLst>
+          </p:cNvPr>
+          <p:cNvSpPr/>
+          <p:nvPr/>
+        </p:nvSpPr>
+        <p:spPr>
+          <a:xfrm>
+            <a:off x="9752835" y="3503428"/>
+            <a:ext cx="1392865" cy="1392865"/>
+          </a:xfrm>
+          <a:prstGeom prst="ellipse">
+            <a:avLst/>
+          </a:prstGeom>
+          <a:solidFill>
+            <a:schemeClr val="accent2"/>
+          </a:solidFill>
+          <a:ln>
+            <a:noFill/>
+          </a:ln>
+        </p:spPr>
+        <p:style>
+          <a:lnRef idx="2">
+            <a:schemeClr val="accent1">
+              <a:shade val="50000"/>
+            </a:schemeClr>
+          </a:lnRef>
+          <a:fillRef idx="1">
+            <a:schemeClr val="accent1"/>
+          </a:fillRef>
+          <a:effectRef idx="0">
+            <a:schemeClr val="accent1"/>
+          </a:effectRef>
+          <a:fontRef idx="minor">
+            <a:schemeClr val="lt1"/>
+          </a:fontRef>
+        </p:style>
+        <p:txBody>
+          <a:bodyPr rtlCol="0" anchor="ctr"/>
+          <a:lstStyle/>
+          <a:p>
+            <a:pPr algn="ctr"/>
+            <a:r>
+              <a:rPr lang="en-US" altLang="ko-KR" dirty="0"/>
+              <a:t>c4</a:t>
+            </a:r>
+            <a:endParaRPr lang="ko-KR" altLang="en-US" dirty="0"/>
+          </a:p>
+        </p:txBody>
+      </p:sp>
+      <p:cxnSp>
+        <p:nvCxnSpPr>
+          <p:cNvPr id="15" name="직선 화살표 연결선 14">
+            <a:extLst>
+              <a:ext uri="{FF2B5EF4-FFF2-40B4-BE49-F238E27FC236}">
+                <a16:creationId xmlns:a16="http://schemas.microsoft.com/office/drawing/2014/main" id="{618900CA-6951-B981-52E0-CC4C3967192E}"/>
+              </a:ext>
+            </a:extLst>
+          </p:cNvPr>
+          <p:cNvCxnSpPr>
+            <a:stCxn id="12" idx="2"/>
+            <a:endCxn id="11" idx="6"/>
+          </p:cNvCxnSpPr>
+          <p:nvPr/>
+        </p:nvCxnSpPr>
+        <p:spPr>
+          <a:xfrm flipH="1">
+            <a:off x="2399659" y="4199861"/>
+            <a:ext cx="793645" cy="0"/>
+          </a:xfrm>
+          <a:prstGeom prst="straightConnector1">
+            <a:avLst/>
+          </a:prstGeom>
+          <a:ln>
             <a:solidFill>
-              <a:schemeClr val="accent2"/>
-            </a:solidFill>
-            <a:ln>
-              <a:noFill/>
-            </a:ln>
-          </p:spPr>
-          <p:style>
-            <a:lnRef idx="2">
-              <a:schemeClr val="accent1">
-                <a:shade val="50000"/>
-              </a:schemeClr>
-            </a:lnRef>
-            <a:fillRef idx="1">
-              <a:schemeClr val="accent1"/>
-            </a:fillRef>
-            <a:effectRef idx="0">
-              <a:schemeClr val="accent1"/>
-            </a:effectRef>
-            <a:fontRef idx="minor">
-              <a:schemeClr val="lt1"/>
-            </a:fontRef>
-          </p:style>
-          <p:txBody>
-            <a:bodyPr rtlCol="0" anchor="ctr"/>
-            <a:lstStyle/>
-            <a:p>
-              <a:pPr algn="ctr"/>
-              <a:r>
-                <a:rPr lang="en-US" altLang="ko-KR" dirty="0"/>
-                <a:t>c0</a:t>
-              </a:r>
-              <a:endParaRPr lang="ko-KR" altLang="en-US" dirty="0"/>
-            </a:p>
-          </p:txBody>
-        </p:sp>
-        <p:sp>
-          <p:nvSpPr>
-            <p:cNvPr id="12" name="타원 11">
-              <a:extLst>
-                <a:ext uri="{FF2B5EF4-FFF2-40B4-BE49-F238E27FC236}">
-                  <a16:creationId xmlns:a16="http://schemas.microsoft.com/office/drawing/2014/main" id="{01CB9947-7B37-E3C8-7559-EB2CB753EC48}"/>
-                </a:ext>
-              </a:extLst>
-            </p:cNvPr>
-            <p:cNvSpPr/>
-            <p:nvPr/>
-          </p:nvSpPr>
-          <p:spPr>
-            <a:xfrm>
-              <a:off x="2827627" y="3503428"/>
-              <a:ext cx="1392865" cy="1392865"/>
-            </a:xfrm>
-            <a:prstGeom prst="ellipse">
-              <a:avLst/>
-            </a:prstGeom>
-            <a:solidFill>
-              <a:schemeClr val="accent2"/>
-            </a:solidFill>
-            <a:ln>
-              <a:noFill/>
-            </a:ln>
-          </p:spPr>
-          <p:style>
-            <a:lnRef idx="2">
-              <a:schemeClr val="accent1">
-                <a:shade val="50000"/>
-              </a:schemeClr>
-            </a:lnRef>
-            <a:fillRef idx="1">
-              <a:schemeClr val="accent1"/>
-            </a:fillRef>
-            <a:effectRef idx="0">
-              <a:schemeClr val="accent1"/>
-            </a:effectRef>
-            <a:fontRef idx="minor">
-              <a:schemeClr val="lt1"/>
-            </a:fontRef>
-          </p:style>
-          <p:txBody>
-            <a:bodyPr rtlCol="0" anchor="ctr"/>
-            <a:lstStyle/>
-            <a:p>
-              <a:pPr algn="ctr"/>
-              <a:r>
-                <a:rPr lang="en-US" altLang="ko-KR" dirty="0"/>
-                <a:t>c1</a:t>
-              </a:r>
-              <a:endParaRPr lang="ko-KR" altLang="en-US" dirty="0"/>
-            </a:p>
-          </p:txBody>
-        </p:sp>
-        <p:sp>
-          <p:nvSpPr>
-            <p:cNvPr id="13" name="타원 12">
-              <a:extLst>
-                <a:ext uri="{FF2B5EF4-FFF2-40B4-BE49-F238E27FC236}">
-                  <a16:creationId xmlns:a16="http://schemas.microsoft.com/office/drawing/2014/main" id="{9345E8B3-B823-0FF7-E412-00719B76822C}"/>
-                </a:ext>
-              </a:extLst>
-            </p:cNvPr>
-            <p:cNvSpPr/>
-            <p:nvPr/>
-          </p:nvSpPr>
-          <p:spPr>
-            <a:xfrm>
-              <a:off x="7401601" y="1973482"/>
-              <a:ext cx="1392865" cy="1392865"/>
-            </a:xfrm>
-            <a:prstGeom prst="ellipse">
-              <a:avLst/>
-            </a:prstGeom>
-            <a:solidFill>
-              <a:schemeClr val="accent2">
-                <a:alpha val="35000"/>
+              <a:schemeClr val="tx1">
+                <a:lumMod val="65000"/>
+                <a:lumOff val="35000"/>
               </a:schemeClr>
             </a:solidFill>
-            <a:ln>
-              <a:noFill/>
-            </a:ln>
-          </p:spPr>
-          <p:style>
-            <a:lnRef idx="2">
-              <a:schemeClr val="accent1">
-                <a:shade val="50000"/>
+            <a:tailEnd type="triangle"/>
+          </a:ln>
+        </p:spPr>
+        <p:style>
+          <a:lnRef idx="1">
+            <a:schemeClr val="accent1"/>
+          </a:lnRef>
+          <a:fillRef idx="0">
+            <a:schemeClr val="accent1"/>
+          </a:fillRef>
+          <a:effectRef idx="0">
+            <a:schemeClr val="accent1"/>
+          </a:effectRef>
+          <a:fontRef idx="minor">
+            <a:schemeClr val="tx1"/>
+          </a:fontRef>
+        </p:style>
+      </p:cxnSp>
+      <p:cxnSp>
+        <p:nvCxnSpPr>
+          <p:cNvPr id="16" name="직선 화살표 연결선 15">
+            <a:extLst>
+              <a:ext uri="{FF2B5EF4-FFF2-40B4-BE49-F238E27FC236}">
+                <a16:creationId xmlns:a16="http://schemas.microsoft.com/office/drawing/2014/main" id="{5FE74F36-E51C-DA95-3002-8CFBCE32009C}"/>
+              </a:ext>
+            </a:extLst>
+          </p:cNvPr>
+          <p:cNvCxnSpPr>
+            <a:cxnSpLocks/>
+            <a:stCxn id="13" idx="3"/>
+            <a:endCxn id="20" idx="6"/>
+          </p:cNvCxnSpPr>
+          <p:nvPr/>
+        </p:nvCxnSpPr>
+        <p:spPr>
+          <a:xfrm flipH="1">
+            <a:off x="6772679" y="3162367"/>
+            <a:ext cx="1198579" cy="1037494"/>
+          </a:xfrm>
+          <a:prstGeom prst="straightConnector1">
+            <a:avLst/>
+          </a:prstGeom>
+          <a:ln>
+            <a:solidFill>
+              <a:schemeClr val="tx1">
+                <a:lumMod val="65000"/>
+                <a:lumOff val="35000"/>
               </a:schemeClr>
-            </a:lnRef>
-            <a:fillRef idx="1">
-              <a:schemeClr val="accent1"/>
-            </a:fillRef>
-            <a:effectRef idx="0">
-              <a:schemeClr val="accent1"/>
-            </a:effectRef>
-            <a:fontRef idx="minor">
-              <a:schemeClr val="lt1"/>
-            </a:fontRef>
-          </p:style>
-          <p:txBody>
-            <a:bodyPr rtlCol="0" anchor="ctr"/>
-            <a:lstStyle/>
-            <a:p>
-              <a:pPr algn="ctr"/>
-              <a:r>
-                <a:rPr lang="en-US" altLang="ko-KR" dirty="0"/>
-                <a:t>c3</a:t>
-              </a:r>
-              <a:endParaRPr lang="ko-KR" altLang="en-US" dirty="0"/>
-            </a:p>
-          </p:txBody>
-        </p:sp>
-        <p:sp>
-          <p:nvSpPr>
-            <p:cNvPr id="14" name="타원 13">
-              <a:extLst>
-                <a:ext uri="{FF2B5EF4-FFF2-40B4-BE49-F238E27FC236}">
-                  <a16:creationId xmlns:a16="http://schemas.microsoft.com/office/drawing/2014/main" id="{88C94E82-9482-313B-62CC-1338AFBF7227}"/>
-                </a:ext>
-              </a:extLst>
-            </p:cNvPr>
-            <p:cNvSpPr/>
-            <p:nvPr/>
-          </p:nvSpPr>
-          <p:spPr>
-            <a:xfrm>
-              <a:off x="9387158" y="3503428"/>
-              <a:ext cx="1392865" cy="1392865"/>
-            </a:xfrm>
-            <a:prstGeom prst="ellipse">
-              <a:avLst/>
-            </a:prstGeom>
+            </a:solidFill>
+            <a:tailEnd type="triangle"/>
+          </a:ln>
+        </p:spPr>
+        <p:style>
+          <a:lnRef idx="1">
+            <a:schemeClr val="accent1"/>
+          </a:lnRef>
+          <a:fillRef idx="0">
+            <a:schemeClr val="accent1"/>
+          </a:fillRef>
+          <a:effectRef idx="0">
+            <a:schemeClr val="accent1"/>
+          </a:effectRef>
+          <a:fontRef idx="minor">
+            <a:schemeClr val="tx1"/>
+          </a:fontRef>
+        </p:style>
+      </p:cxnSp>
+      <p:cxnSp>
+        <p:nvCxnSpPr>
+          <p:cNvPr id="17" name="직선 화살표 연결선 16">
+            <a:extLst>
+              <a:ext uri="{FF2B5EF4-FFF2-40B4-BE49-F238E27FC236}">
+                <a16:creationId xmlns:a16="http://schemas.microsoft.com/office/drawing/2014/main" id="{158CB750-060A-85B2-FBBA-3BBAF78FD017}"/>
+              </a:ext>
+            </a:extLst>
+          </p:cNvPr>
+          <p:cNvCxnSpPr>
+            <a:cxnSpLocks/>
+            <a:stCxn id="14" idx="2"/>
+            <a:endCxn id="20" idx="6"/>
+          </p:cNvCxnSpPr>
+          <p:nvPr/>
+        </p:nvCxnSpPr>
+        <p:spPr>
+          <a:xfrm flipH="1">
+            <a:off x="6772679" y="4199861"/>
+            <a:ext cx="2980156" cy="0"/>
+          </a:xfrm>
+          <a:prstGeom prst="straightConnector1">
+            <a:avLst/>
+          </a:prstGeom>
+          <a:ln>
             <a:solidFill>
-              <a:schemeClr val="accent2"/>
+              <a:schemeClr val="tx1">
+                <a:lumMod val="65000"/>
+                <a:lumOff val="35000"/>
+              </a:schemeClr>
             </a:solidFill>
-            <a:ln>
-              <a:noFill/>
-            </a:ln>
-          </p:spPr>
-          <p:style>
-            <a:lnRef idx="2">
-              <a:schemeClr val="accent1">
-                <a:shade val="50000"/>
+            <a:tailEnd type="triangle"/>
+          </a:ln>
+        </p:spPr>
+        <p:style>
+          <a:lnRef idx="1">
+            <a:schemeClr val="accent1"/>
+          </a:lnRef>
+          <a:fillRef idx="0">
+            <a:schemeClr val="accent1"/>
+          </a:fillRef>
+          <a:effectRef idx="0">
+            <a:schemeClr val="accent1"/>
+          </a:effectRef>
+          <a:fontRef idx="minor">
+            <a:schemeClr val="tx1"/>
+          </a:fontRef>
+        </p:style>
+      </p:cxnSp>
+      <p:sp>
+        <p:nvSpPr>
+          <p:cNvPr id="18" name="TextBox 17">
+            <a:extLst>
+              <a:ext uri="{FF2B5EF4-FFF2-40B4-BE49-F238E27FC236}">
+                <a16:creationId xmlns:a16="http://schemas.microsoft.com/office/drawing/2014/main" id="{50A9A7EA-25A5-47C0-B729-94E5FDCD2155}"/>
+              </a:ext>
+            </a:extLst>
+          </p:cNvPr>
+          <p:cNvSpPr txBox="1"/>
+          <p:nvPr/>
+        </p:nvSpPr>
+        <p:spPr>
+          <a:xfrm>
+            <a:off x="7617997" y="1440600"/>
+            <a:ext cx="1691425" cy="369332"/>
+          </a:xfrm>
+          <a:prstGeom prst="rect">
+            <a:avLst/>
+          </a:prstGeom>
+          <a:noFill/>
+        </p:spPr>
+        <p:txBody>
+          <a:bodyPr wrap="none" rtlCol="0">
+            <a:spAutoFit/>
+          </a:bodyPr>
+          <a:lstStyle/>
+          <a:p>
+            <a:pPr algn="ctr"/>
+            <a:r>
+              <a:rPr lang="en-US" altLang="ko-KR" dirty="0"/>
+              <a:t>feature </a:t>
+            </a:r>
+            <a:r>
+              <a:rPr lang="ko-KR" altLang="en-US" dirty="0" err="1"/>
+              <a:t>브랜치</a:t>
+            </a:r>
+            <a:endParaRPr lang="ko-KR" altLang="en-US" dirty="0"/>
+          </a:p>
+        </p:txBody>
+      </p:sp>
+      <p:sp>
+        <p:nvSpPr>
+          <p:cNvPr id="19" name="TextBox 18">
+            <a:extLst>
+              <a:ext uri="{FF2B5EF4-FFF2-40B4-BE49-F238E27FC236}">
+                <a16:creationId xmlns:a16="http://schemas.microsoft.com/office/drawing/2014/main" id="{6307CC1E-BBDF-7E1D-C8EA-292D1BB13168}"/>
+              </a:ext>
+            </a:extLst>
+          </p:cNvPr>
+          <p:cNvSpPr txBox="1"/>
+          <p:nvPr/>
+        </p:nvSpPr>
+        <p:spPr>
+          <a:xfrm>
+            <a:off x="9713329" y="3058414"/>
+            <a:ext cx="1471878" cy="369332"/>
+          </a:xfrm>
+          <a:prstGeom prst="rect">
+            <a:avLst/>
+          </a:prstGeom>
+          <a:noFill/>
+        </p:spPr>
+        <p:txBody>
+          <a:bodyPr wrap="none" rtlCol="0">
+            <a:spAutoFit/>
+          </a:bodyPr>
+          <a:lstStyle/>
+          <a:p>
+            <a:pPr algn="ctr"/>
+            <a:r>
+              <a:rPr lang="en-US" altLang="ko-KR" dirty="0"/>
+              <a:t>main </a:t>
+            </a:r>
+            <a:r>
+              <a:rPr lang="ko-KR" altLang="en-US" dirty="0" err="1"/>
+              <a:t>브랜치</a:t>
+            </a:r>
+            <a:endParaRPr lang="ko-KR" altLang="en-US" dirty="0"/>
+          </a:p>
+        </p:txBody>
+      </p:sp>
+      <p:sp>
+        <p:nvSpPr>
+          <p:cNvPr id="20" name="타원 19">
+            <a:extLst>
+              <a:ext uri="{FF2B5EF4-FFF2-40B4-BE49-F238E27FC236}">
+                <a16:creationId xmlns:a16="http://schemas.microsoft.com/office/drawing/2014/main" id="{1557E2A6-F2F7-A180-6465-21EEB2CC2A03}"/>
+              </a:ext>
+            </a:extLst>
+          </p:cNvPr>
+          <p:cNvSpPr/>
+          <p:nvPr/>
+        </p:nvSpPr>
+        <p:spPr>
+          <a:xfrm>
+            <a:off x="5379814" y="3503428"/>
+            <a:ext cx="1392865" cy="1392865"/>
+          </a:xfrm>
+          <a:prstGeom prst="ellipse">
+            <a:avLst/>
+          </a:prstGeom>
+          <a:solidFill>
+            <a:schemeClr val="accent2"/>
+          </a:solidFill>
+          <a:ln>
+            <a:noFill/>
+          </a:ln>
+        </p:spPr>
+        <p:style>
+          <a:lnRef idx="2">
+            <a:schemeClr val="accent1">
+              <a:shade val="50000"/>
+            </a:schemeClr>
+          </a:lnRef>
+          <a:fillRef idx="1">
+            <a:schemeClr val="accent1"/>
+          </a:fillRef>
+          <a:effectRef idx="0">
+            <a:schemeClr val="accent1"/>
+          </a:effectRef>
+          <a:fontRef idx="minor">
+            <a:schemeClr val="lt1"/>
+          </a:fontRef>
+        </p:style>
+        <p:txBody>
+          <a:bodyPr rtlCol="0" anchor="ctr"/>
+          <a:lstStyle/>
+          <a:p>
+            <a:pPr algn="ctr"/>
+            <a:r>
+              <a:rPr lang="en-US" altLang="ko-KR" dirty="0"/>
+              <a:t>c2</a:t>
+            </a:r>
+            <a:endParaRPr lang="ko-KR" altLang="en-US" dirty="0"/>
+          </a:p>
+        </p:txBody>
+      </p:sp>
+      <p:cxnSp>
+        <p:nvCxnSpPr>
+          <p:cNvPr id="21" name="직선 화살표 연결선 20">
+            <a:extLst>
+              <a:ext uri="{FF2B5EF4-FFF2-40B4-BE49-F238E27FC236}">
+                <a16:creationId xmlns:a16="http://schemas.microsoft.com/office/drawing/2014/main" id="{7D0B2F6B-5872-4965-C4E6-B7F80CDE9B54}"/>
+              </a:ext>
+            </a:extLst>
+          </p:cNvPr>
+          <p:cNvCxnSpPr/>
+          <p:nvPr/>
+        </p:nvCxnSpPr>
+        <p:spPr>
+          <a:xfrm flipH="1">
+            <a:off x="4586169" y="4199861"/>
+            <a:ext cx="793645" cy="0"/>
+          </a:xfrm>
+          <a:prstGeom prst="straightConnector1">
+            <a:avLst/>
+          </a:prstGeom>
+          <a:ln>
+            <a:solidFill>
+              <a:schemeClr val="tx1">
+                <a:lumMod val="65000"/>
+                <a:lumOff val="35000"/>
               </a:schemeClr>
-            </a:lnRef>
-            <a:fillRef idx="1">
-              <a:schemeClr val="accent1"/>
-            </a:fillRef>
-            <a:effectRef idx="0">
-              <a:schemeClr val="accent1"/>
-            </a:effectRef>
-            <a:fontRef idx="minor">
-              <a:schemeClr val="lt1"/>
-            </a:fontRef>
-          </p:style>
-          <p:txBody>
-            <a:bodyPr rtlCol="0" anchor="ctr"/>
-            <a:lstStyle/>
-            <a:p>
-              <a:pPr algn="ctr"/>
-              <a:r>
-                <a:rPr lang="en-US" altLang="ko-KR" dirty="0"/>
-                <a:t>c4</a:t>
-              </a:r>
-              <a:endParaRPr lang="ko-KR" altLang="en-US" dirty="0"/>
-            </a:p>
-          </p:txBody>
-        </p:sp>
-        <p:cxnSp>
-          <p:nvCxnSpPr>
-            <p:cNvPr id="15" name="직선 화살표 연결선 14">
-              <a:extLst>
-                <a:ext uri="{FF2B5EF4-FFF2-40B4-BE49-F238E27FC236}">
-                  <a16:creationId xmlns:a16="http://schemas.microsoft.com/office/drawing/2014/main" id="{618900CA-6951-B981-52E0-CC4C3967192E}"/>
-                </a:ext>
-              </a:extLst>
-            </p:cNvPr>
-            <p:cNvCxnSpPr>
-              <a:stCxn id="12" idx="2"/>
-              <a:endCxn id="11" idx="6"/>
-            </p:cNvCxnSpPr>
-            <p:nvPr/>
-          </p:nvCxnSpPr>
-          <p:spPr>
-            <a:xfrm flipH="1">
-              <a:off x="2033982" y="4199861"/>
-              <a:ext cx="793645" cy="0"/>
-            </a:xfrm>
-            <a:prstGeom prst="straightConnector1">
-              <a:avLst/>
-            </a:prstGeom>
-            <a:ln>
-              <a:solidFill>
-                <a:schemeClr val="tx1">
-                  <a:lumMod val="65000"/>
-                  <a:lumOff val="35000"/>
-                </a:schemeClr>
-              </a:solidFill>
-              <a:tailEnd type="triangle"/>
-            </a:ln>
-          </p:spPr>
-          <p:style>
-            <a:lnRef idx="1">
-              <a:schemeClr val="accent1"/>
-            </a:lnRef>
-            <a:fillRef idx="0">
-              <a:schemeClr val="accent1"/>
-            </a:fillRef>
-            <a:effectRef idx="0">
-              <a:schemeClr val="accent1"/>
-            </a:effectRef>
-            <a:fontRef idx="minor">
-              <a:schemeClr val="tx1"/>
-            </a:fontRef>
-          </p:style>
-        </p:cxnSp>
-        <p:cxnSp>
-          <p:nvCxnSpPr>
-            <p:cNvPr id="16" name="직선 화살표 연결선 15">
-              <a:extLst>
-                <a:ext uri="{FF2B5EF4-FFF2-40B4-BE49-F238E27FC236}">
-                  <a16:creationId xmlns:a16="http://schemas.microsoft.com/office/drawing/2014/main" id="{5FE74F36-E51C-DA95-3002-8CFBCE32009C}"/>
-                </a:ext>
-              </a:extLst>
-            </p:cNvPr>
-            <p:cNvCxnSpPr>
-              <a:cxnSpLocks/>
-              <a:stCxn id="13" idx="3"/>
-              <a:endCxn id="20" idx="6"/>
-            </p:cNvCxnSpPr>
-            <p:nvPr/>
-          </p:nvCxnSpPr>
-          <p:spPr>
-            <a:xfrm flipH="1">
-              <a:off x="6407002" y="3162367"/>
-              <a:ext cx="1198579" cy="1037494"/>
-            </a:xfrm>
-            <a:prstGeom prst="straightConnector1">
-              <a:avLst/>
-            </a:prstGeom>
-            <a:ln>
-              <a:solidFill>
-                <a:schemeClr val="tx1">
-                  <a:lumMod val="65000"/>
-                  <a:lumOff val="35000"/>
-                </a:schemeClr>
-              </a:solidFill>
-              <a:tailEnd type="triangle"/>
-            </a:ln>
-          </p:spPr>
-          <p:style>
-            <a:lnRef idx="1">
-              <a:schemeClr val="accent1"/>
-            </a:lnRef>
-            <a:fillRef idx="0">
-              <a:schemeClr val="accent1"/>
-            </a:fillRef>
-            <a:effectRef idx="0">
-              <a:schemeClr val="accent1"/>
-            </a:effectRef>
-            <a:fontRef idx="minor">
-              <a:schemeClr val="tx1"/>
-            </a:fontRef>
-          </p:style>
-        </p:cxnSp>
-        <p:cxnSp>
-          <p:nvCxnSpPr>
-            <p:cNvPr id="17" name="직선 화살표 연결선 16">
-              <a:extLst>
-                <a:ext uri="{FF2B5EF4-FFF2-40B4-BE49-F238E27FC236}">
-                  <a16:creationId xmlns:a16="http://schemas.microsoft.com/office/drawing/2014/main" id="{158CB750-060A-85B2-FBBA-3BBAF78FD017}"/>
-                </a:ext>
-              </a:extLst>
-            </p:cNvPr>
-            <p:cNvCxnSpPr>
-              <a:cxnSpLocks/>
-              <a:stCxn id="14" idx="2"/>
-              <a:endCxn id="20" idx="6"/>
-            </p:cNvCxnSpPr>
-            <p:nvPr/>
-          </p:nvCxnSpPr>
-          <p:spPr>
-            <a:xfrm flipH="1">
-              <a:off x="6407002" y="4199861"/>
-              <a:ext cx="2980156" cy="0"/>
-            </a:xfrm>
-            <a:prstGeom prst="straightConnector1">
-              <a:avLst/>
-            </a:prstGeom>
-            <a:ln>
-              <a:solidFill>
-                <a:schemeClr val="tx1">
-                  <a:lumMod val="65000"/>
-                  <a:lumOff val="35000"/>
-                </a:schemeClr>
-              </a:solidFill>
-              <a:tailEnd type="triangle"/>
-            </a:ln>
-          </p:spPr>
-          <p:style>
-            <a:lnRef idx="1">
-              <a:schemeClr val="accent1"/>
-            </a:lnRef>
-            <a:fillRef idx="0">
-              <a:schemeClr val="accent1"/>
-            </a:fillRef>
-            <a:effectRef idx="0">
-              <a:schemeClr val="accent1"/>
-            </a:effectRef>
-            <a:fontRef idx="minor">
-              <a:schemeClr val="tx1"/>
-            </a:fontRef>
-          </p:style>
-        </p:cxnSp>
-        <p:sp>
-          <p:nvSpPr>
-            <p:cNvPr id="18" name="TextBox 17">
-              <a:extLst>
-                <a:ext uri="{FF2B5EF4-FFF2-40B4-BE49-F238E27FC236}">
-                  <a16:creationId xmlns:a16="http://schemas.microsoft.com/office/drawing/2014/main" id="{50A9A7EA-25A5-47C0-B729-94E5FDCD2155}"/>
-                </a:ext>
-              </a:extLst>
-            </p:cNvPr>
-            <p:cNvSpPr txBox="1"/>
-            <p:nvPr/>
-          </p:nvSpPr>
-          <p:spPr>
-            <a:xfrm>
-              <a:off x="7252320" y="1440600"/>
-              <a:ext cx="1691425" cy="369332"/>
-            </a:xfrm>
-            <a:prstGeom prst="rect">
-              <a:avLst/>
-            </a:prstGeom>
-            <a:noFill/>
-          </p:spPr>
-          <p:txBody>
-            <a:bodyPr wrap="none" rtlCol="0">
-              <a:spAutoFit/>
-            </a:bodyPr>
-            <a:lstStyle/>
-            <a:p>
-              <a:pPr algn="ctr"/>
-              <a:r>
-                <a:rPr lang="en-US" altLang="ko-KR" dirty="0"/>
-                <a:t>feature </a:t>
-              </a:r>
-              <a:r>
-                <a:rPr lang="ko-KR" altLang="en-US" dirty="0" err="1"/>
-                <a:t>브랜치</a:t>
-              </a:r>
-              <a:endParaRPr lang="ko-KR" altLang="en-US" dirty="0"/>
-            </a:p>
-          </p:txBody>
-        </p:sp>
-        <p:sp>
-          <p:nvSpPr>
-            <p:cNvPr id="19" name="TextBox 18">
-              <a:extLst>
-                <a:ext uri="{FF2B5EF4-FFF2-40B4-BE49-F238E27FC236}">
-                  <a16:creationId xmlns:a16="http://schemas.microsoft.com/office/drawing/2014/main" id="{6307CC1E-BBDF-7E1D-C8EA-292D1BB13168}"/>
-                </a:ext>
-              </a:extLst>
-            </p:cNvPr>
-            <p:cNvSpPr txBox="1"/>
-            <p:nvPr/>
-          </p:nvSpPr>
-          <p:spPr>
-            <a:xfrm>
-              <a:off x="9347652" y="3058414"/>
-              <a:ext cx="1471878" cy="369332"/>
-            </a:xfrm>
-            <a:prstGeom prst="rect">
-              <a:avLst/>
-            </a:prstGeom>
-            <a:noFill/>
-          </p:spPr>
-          <p:txBody>
-            <a:bodyPr wrap="none" rtlCol="0">
-              <a:spAutoFit/>
-            </a:bodyPr>
-            <a:lstStyle/>
-            <a:p>
-              <a:pPr algn="ctr"/>
-              <a:r>
-                <a:rPr lang="en-US" altLang="ko-KR" dirty="0"/>
-                <a:t>main </a:t>
-              </a:r>
-              <a:r>
-                <a:rPr lang="ko-KR" altLang="en-US" dirty="0" err="1"/>
-                <a:t>브랜치</a:t>
-              </a:r>
-              <a:endParaRPr lang="ko-KR" altLang="en-US" dirty="0"/>
-            </a:p>
-          </p:txBody>
-        </p:sp>
-        <p:sp>
-          <p:nvSpPr>
-            <p:cNvPr id="20" name="타원 19">
-              <a:extLst>
-                <a:ext uri="{FF2B5EF4-FFF2-40B4-BE49-F238E27FC236}">
-                  <a16:creationId xmlns:a16="http://schemas.microsoft.com/office/drawing/2014/main" id="{1557E2A6-F2F7-A180-6465-21EEB2CC2A03}"/>
-                </a:ext>
-              </a:extLst>
-            </p:cNvPr>
-            <p:cNvSpPr/>
-            <p:nvPr/>
-          </p:nvSpPr>
-          <p:spPr>
-            <a:xfrm>
-              <a:off x="5014137" y="3503428"/>
-              <a:ext cx="1392865" cy="1392865"/>
-            </a:xfrm>
-            <a:prstGeom prst="ellipse">
-              <a:avLst/>
-            </a:prstGeom>
-            <a:solidFill>
-              <a:schemeClr val="accent2"/>
             </a:solidFill>
-            <a:ln>
-              <a:noFill/>
-            </a:ln>
-          </p:spPr>
-          <p:style>
-            <a:lnRef idx="2">
-              <a:schemeClr val="accent1">
-                <a:shade val="50000"/>
-              </a:schemeClr>
-            </a:lnRef>
-            <a:fillRef idx="1">
-              <a:schemeClr val="accent1"/>
-            </a:fillRef>
-            <a:effectRef idx="0">
-              <a:schemeClr val="accent1"/>
-            </a:effectRef>
-            <a:fontRef idx="minor">
-              <a:schemeClr val="lt1"/>
-            </a:fontRef>
-          </p:style>
-          <p:txBody>
-            <a:bodyPr rtlCol="0" anchor="ctr"/>
-            <a:lstStyle/>
-            <a:p>
-              <a:pPr algn="ctr"/>
-              <a:r>
-                <a:rPr lang="en-US" altLang="ko-KR" dirty="0"/>
-                <a:t>c2</a:t>
-              </a:r>
-              <a:endParaRPr lang="ko-KR" altLang="en-US" dirty="0"/>
-            </a:p>
-          </p:txBody>
-        </p:sp>
-        <p:cxnSp>
-          <p:nvCxnSpPr>
-            <p:cNvPr id="21" name="직선 화살표 연결선 20">
-              <a:extLst>
-                <a:ext uri="{FF2B5EF4-FFF2-40B4-BE49-F238E27FC236}">
-                  <a16:creationId xmlns:a16="http://schemas.microsoft.com/office/drawing/2014/main" id="{7D0B2F6B-5872-4965-C4E6-B7F80CDE9B54}"/>
-                </a:ext>
-              </a:extLst>
-            </p:cNvPr>
-            <p:cNvCxnSpPr/>
-            <p:nvPr/>
-          </p:nvCxnSpPr>
-          <p:spPr>
-            <a:xfrm flipH="1">
-              <a:off x="4220492" y="4199861"/>
-              <a:ext cx="793645" cy="0"/>
-            </a:xfrm>
-            <a:prstGeom prst="straightConnector1">
-              <a:avLst/>
-            </a:prstGeom>
-            <a:ln>
-              <a:solidFill>
-                <a:schemeClr val="tx1">
-                  <a:lumMod val="65000"/>
-                  <a:lumOff val="35000"/>
-                </a:schemeClr>
-              </a:solidFill>
-              <a:tailEnd type="triangle"/>
-            </a:ln>
-          </p:spPr>
-          <p:style>
-            <a:lnRef idx="1">
-              <a:schemeClr val="accent1"/>
-            </a:lnRef>
-            <a:fillRef idx="0">
-              <a:schemeClr val="accent1"/>
-            </a:fillRef>
-            <a:effectRef idx="0">
-              <a:schemeClr val="accent1"/>
-            </a:effectRef>
-            <a:fontRef idx="minor">
-              <a:schemeClr val="tx1"/>
-            </a:fontRef>
-          </p:style>
-        </p:cxnSp>
-      </p:grpSp>
+            <a:tailEnd type="triangle"/>
+          </a:ln>
+        </p:spPr>
+        <p:style>
+          <a:lnRef idx="1">
+            <a:schemeClr val="accent1"/>
+          </a:lnRef>
+          <a:fillRef idx="0">
+            <a:schemeClr val="accent1"/>
+          </a:fillRef>
+          <a:effectRef idx="0">
+            <a:schemeClr val="accent1"/>
+          </a:effectRef>
+          <a:fontRef idx="minor">
+            <a:schemeClr val="tx1"/>
+          </a:fontRef>
+        </p:style>
+      </p:cxnSp>
       <p:sp>
         <p:nvSpPr>
           <p:cNvPr id="22" name="직사각형 21">
@@ -8242,8 +8307,8 @@
         </p:nvSpPr>
         <p:spPr>
           <a:xfrm>
-            <a:off x="1935384" y="5779557"/>
-            <a:ext cx="8321445" cy="646331"/>
+            <a:off x="1638027" y="5779557"/>
+            <a:ext cx="8916160" cy="646331"/>
           </a:xfrm>
           <a:prstGeom prst="rect">
             <a:avLst/>
@@ -8338,7 +8403,7 @@
             </a:r>
             <a:r>
               <a:rPr lang="ko-KR" altLang="en-US" dirty="0"/>
-              <a:t>를 가리킨다</a:t>
+              <a:t>를 가리키게 된다</a:t>
             </a:r>
             <a:r>
               <a:rPr lang="en-US" altLang="ko-KR" dirty="0"/>
@@ -8454,120 +8519,6 @@
             <a:r>
               <a:rPr lang="en-US" altLang="ko-KR" dirty="0"/>
               <a:t>c1</a:t>
-            </a:r>
-            <a:endParaRPr lang="ko-KR" altLang="en-US" dirty="0"/>
-          </a:p>
-        </p:txBody>
-      </p:sp>
-      <p:sp>
-        <p:nvSpPr>
-          <p:cNvPr id="8" name="타원 7">
-            <a:extLst>
-              <a:ext uri="{FF2B5EF4-FFF2-40B4-BE49-F238E27FC236}">
-                <a16:creationId xmlns:a16="http://schemas.microsoft.com/office/drawing/2014/main" id="{28672297-3147-2A47-EB94-E38B3AD61612}"/>
-              </a:ext>
-            </a:extLst>
-          </p:cNvPr>
-          <p:cNvSpPr/>
-          <p:nvPr/>
-        </p:nvSpPr>
-        <p:spPr>
-          <a:xfrm>
-            <a:off x="7070844" y="1973482"/>
-            <a:ext cx="1392865" cy="1392865"/>
-          </a:xfrm>
-          <a:prstGeom prst="ellipse">
-            <a:avLst/>
-          </a:prstGeom>
-          <a:solidFill>
-            <a:schemeClr val="accent2">
-              <a:alpha val="35000"/>
-            </a:schemeClr>
-          </a:solidFill>
-          <a:ln>
-            <a:noFill/>
-          </a:ln>
-        </p:spPr>
-        <p:style>
-          <a:lnRef idx="2">
-            <a:schemeClr val="accent1">
-              <a:shade val="50000"/>
-            </a:schemeClr>
-          </a:lnRef>
-          <a:fillRef idx="1">
-            <a:schemeClr val="accent1"/>
-          </a:fillRef>
-          <a:effectRef idx="0">
-            <a:schemeClr val="accent1"/>
-          </a:effectRef>
-          <a:fontRef idx="minor">
-            <a:schemeClr val="lt1"/>
-          </a:fontRef>
-        </p:style>
-        <p:txBody>
-          <a:bodyPr rtlCol="0" anchor="ctr"/>
-          <a:lstStyle/>
-          <a:p>
-            <a:pPr algn="ctr"/>
-            <a:r>
-              <a:rPr lang="en-US" altLang="ko-KR" dirty="0"/>
-              <a:t>c3</a:t>
-            </a:r>
-            <a:endParaRPr lang="ko-KR" altLang="en-US" dirty="0"/>
-          </a:p>
-        </p:txBody>
-      </p:sp>
-      <p:sp>
-        <p:nvSpPr>
-          <p:cNvPr id="9" name="타원 8">
-            <a:extLst>
-              <a:ext uri="{FF2B5EF4-FFF2-40B4-BE49-F238E27FC236}">
-                <a16:creationId xmlns:a16="http://schemas.microsoft.com/office/drawing/2014/main" id="{5CAFD359-8610-3308-E1AC-BE8B1AF0C2B2}"/>
-              </a:ext>
-            </a:extLst>
-          </p:cNvPr>
-          <p:cNvSpPr/>
-          <p:nvPr/>
-        </p:nvSpPr>
-        <p:spPr>
-          <a:xfrm>
-            <a:off x="8764901" y="3503428"/>
-            <a:ext cx="1392865" cy="1392865"/>
-          </a:xfrm>
-          <a:prstGeom prst="ellipse">
-            <a:avLst/>
-          </a:prstGeom>
-          <a:solidFill>
-            <a:schemeClr val="accent2"/>
-          </a:solidFill>
-          <a:ln>
-            <a:noFill/>
-          </a:ln>
-        </p:spPr>
-        <p:style>
-          <a:lnRef idx="2">
-            <a:schemeClr val="accent1">
-              <a:shade val="50000"/>
-            </a:schemeClr>
-          </a:lnRef>
-          <a:fillRef idx="1">
-            <a:schemeClr val="accent1"/>
-          </a:fillRef>
-          <a:effectRef idx="0">
-            <a:schemeClr val="accent1"/>
-          </a:effectRef>
-          <a:fontRef idx="minor">
-            <a:schemeClr val="lt1"/>
-          </a:fontRef>
-        </p:style>
-        <p:txBody>
-          <a:bodyPr rtlCol="0" anchor="ctr"/>
-          <a:lstStyle/>
-          <a:p>
-            <a:pPr algn="ctr"/>
-            <a:r>
-              <a:rPr lang="en-US" altLang="ko-KR" dirty="0"/>
-              <a:t>c4</a:t>
             </a:r>
             <a:endParaRPr lang="ko-KR" altLang="en-US" dirty="0"/>
           </a:p>
@@ -8621,186 +8572,6 @@
           </a:fontRef>
         </p:style>
       </p:cxnSp>
-      <p:cxnSp>
-        <p:nvCxnSpPr>
-          <p:cNvPr id="11" name="직선 화살표 연결선 10">
-            <a:extLst>
-              <a:ext uri="{FF2B5EF4-FFF2-40B4-BE49-F238E27FC236}">
-                <a16:creationId xmlns:a16="http://schemas.microsoft.com/office/drawing/2014/main" id="{2533681A-4444-B8E0-A67B-35F4951F6DC9}"/>
-              </a:ext>
-            </a:extLst>
-          </p:cNvPr>
-          <p:cNvCxnSpPr>
-            <a:cxnSpLocks/>
-            <a:stCxn id="8" idx="3"/>
-            <a:endCxn id="15" idx="6"/>
-          </p:cNvCxnSpPr>
-          <p:nvPr/>
-        </p:nvCxnSpPr>
-        <p:spPr>
-          <a:xfrm flipH="1">
-            <a:off x="6772679" y="3162367"/>
-            <a:ext cx="502145" cy="1037494"/>
-          </a:xfrm>
-          <a:prstGeom prst="straightConnector1">
-            <a:avLst/>
-          </a:prstGeom>
-          <a:ln>
-            <a:solidFill>
-              <a:schemeClr val="tx1">
-                <a:lumMod val="65000"/>
-                <a:lumOff val="35000"/>
-              </a:schemeClr>
-            </a:solidFill>
-            <a:tailEnd type="triangle"/>
-          </a:ln>
-        </p:spPr>
-        <p:style>
-          <a:lnRef idx="1">
-            <a:schemeClr val="accent1"/>
-          </a:lnRef>
-          <a:fillRef idx="0">
-            <a:schemeClr val="accent1"/>
-          </a:fillRef>
-          <a:effectRef idx="0">
-            <a:schemeClr val="accent1"/>
-          </a:effectRef>
-          <a:fontRef idx="minor">
-            <a:schemeClr val="tx1"/>
-          </a:fontRef>
-        </p:style>
-      </p:cxnSp>
-      <p:cxnSp>
-        <p:nvCxnSpPr>
-          <p:cNvPr id="12" name="직선 화살표 연결선 11">
-            <a:extLst>
-              <a:ext uri="{FF2B5EF4-FFF2-40B4-BE49-F238E27FC236}">
-                <a16:creationId xmlns:a16="http://schemas.microsoft.com/office/drawing/2014/main" id="{6A112726-DCEA-EA56-EA51-3C15E39023BF}"/>
-              </a:ext>
-            </a:extLst>
-          </p:cNvPr>
-          <p:cNvCxnSpPr>
-            <a:cxnSpLocks/>
-            <a:stCxn id="9" idx="2"/>
-            <a:endCxn id="15" idx="6"/>
-          </p:cNvCxnSpPr>
-          <p:nvPr/>
-        </p:nvCxnSpPr>
-        <p:spPr>
-          <a:xfrm flipH="1">
-            <a:off x="6772679" y="4199861"/>
-            <a:ext cx="1992222" cy="0"/>
-          </a:xfrm>
-          <a:prstGeom prst="straightConnector1">
-            <a:avLst/>
-          </a:prstGeom>
-          <a:ln>
-            <a:solidFill>
-              <a:schemeClr val="tx1">
-                <a:lumMod val="65000"/>
-                <a:lumOff val="35000"/>
-              </a:schemeClr>
-            </a:solidFill>
-            <a:tailEnd type="triangle"/>
-          </a:ln>
-        </p:spPr>
-        <p:style>
-          <a:lnRef idx="1">
-            <a:schemeClr val="accent1"/>
-          </a:lnRef>
-          <a:fillRef idx="0">
-            <a:schemeClr val="accent1"/>
-          </a:fillRef>
-          <a:effectRef idx="0">
-            <a:schemeClr val="accent1"/>
-          </a:effectRef>
-          <a:fontRef idx="minor">
-            <a:schemeClr val="tx1"/>
-          </a:fontRef>
-        </p:style>
-      </p:cxnSp>
-      <p:sp>
-        <p:nvSpPr>
-          <p:cNvPr id="13" name="TextBox 12">
-            <a:extLst>
-              <a:ext uri="{FF2B5EF4-FFF2-40B4-BE49-F238E27FC236}">
-                <a16:creationId xmlns:a16="http://schemas.microsoft.com/office/drawing/2014/main" id="{5FB467E8-0F9A-A5B4-8EFD-AC367FB13511}"/>
-              </a:ext>
-            </a:extLst>
-          </p:cNvPr>
-          <p:cNvSpPr txBox="1"/>
-          <p:nvPr/>
-        </p:nvSpPr>
-        <p:spPr>
-          <a:xfrm>
-            <a:off x="8652100" y="2738455"/>
-            <a:ext cx="1691425" cy="369332"/>
-          </a:xfrm>
-          <a:prstGeom prst="rect">
-            <a:avLst/>
-          </a:prstGeom>
-          <a:noFill/>
-        </p:spPr>
-        <p:txBody>
-          <a:bodyPr wrap="none" rtlCol="0">
-            <a:spAutoFit/>
-          </a:bodyPr>
-          <a:lstStyle/>
-          <a:p>
-            <a:pPr algn="ctr"/>
-            <a:r>
-              <a:rPr lang="en-US" altLang="ko-KR" dirty="0"/>
-              <a:t>feature </a:t>
-            </a:r>
-            <a:r>
-              <a:rPr lang="ko-KR" altLang="en-US" dirty="0" err="1"/>
-              <a:t>브랜치</a:t>
-            </a:r>
-            <a:endParaRPr lang="ko-KR" altLang="en-US" dirty="0"/>
-          </a:p>
-        </p:txBody>
-      </p:sp>
-      <p:sp>
-        <p:nvSpPr>
-          <p:cNvPr id="14" name="TextBox 13">
-            <a:extLst>
-              <a:ext uri="{FF2B5EF4-FFF2-40B4-BE49-F238E27FC236}">
-                <a16:creationId xmlns:a16="http://schemas.microsoft.com/office/drawing/2014/main" id="{9FA4A953-3D04-CC01-E02E-882E875A3040}"/>
-              </a:ext>
-            </a:extLst>
-          </p:cNvPr>
-          <p:cNvSpPr txBox="1"/>
-          <p:nvPr/>
-        </p:nvSpPr>
-        <p:spPr>
-          <a:xfrm>
-            <a:off x="8761874" y="3082277"/>
-            <a:ext cx="1471878" cy="369332"/>
-          </a:xfrm>
-          <a:prstGeom prst="rect">
-            <a:avLst/>
-          </a:prstGeom>
-          <a:noFill/>
-        </p:spPr>
-        <p:txBody>
-          <a:bodyPr wrap="none" rtlCol="0">
-            <a:spAutoFit/>
-          </a:bodyPr>
-          <a:lstStyle/>
-          <a:p>
-            <a:pPr algn="ctr"/>
-            <a:r>
-              <a:rPr lang="en-US" altLang="ko-KR" dirty="0"/>
-              <a:t>main </a:t>
-            </a:r>
-            <a:r>
-              <a:rPr lang="ko-KR" altLang="en-US" dirty="0" err="1"/>
-              <a:t>브랜치</a:t>
-            </a:r>
-            <a:endParaRPr lang="ko-KR" altLang="en-US" dirty="0"/>
-          </a:p>
-        </p:txBody>
-      </p:sp>
       <p:sp>
         <p:nvSpPr>
           <p:cNvPr id="15" name="타원 14">
@@ -9043,6 +8814,298 @@
             <a:r>
               <a:rPr lang="en-US" altLang="ko-KR" dirty="0"/>
               <a:t>Patch</a:t>
+            </a:r>
+            <a:endParaRPr lang="ko-KR" altLang="en-US" dirty="0"/>
+          </a:p>
+        </p:txBody>
+      </p:sp>
+      <p:sp>
+        <p:nvSpPr>
+          <p:cNvPr id="4" name="타원 3">
+            <a:extLst>
+              <a:ext uri="{FF2B5EF4-FFF2-40B4-BE49-F238E27FC236}">
+                <a16:creationId xmlns:a16="http://schemas.microsoft.com/office/drawing/2014/main" id="{DACAE02D-A119-E9E3-0C8A-86831154FCE2}"/>
+              </a:ext>
+            </a:extLst>
+          </p:cNvPr>
+          <p:cNvSpPr/>
+          <p:nvPr/>
+        </p:nvSpPr>
+        <p:spPr>
+          <a:xfrm>
+            <a:off x="7767278" y="1973482"/>
+            <a:ext cx="1392865" cy="1392865"/>
+          </a:xfrm>
+          <a:prstGeom prst="ellipse">
+            <a:avLst/>
+          </a:prstGeom>
+          <a:solidFill>
+            <a:schemeClr val="accent2">
+              <a:alpha val="35000"/>
+            </a:schemeClr>
+          </a:solidFill>
+          <a:ln>
+            <a:noFill/>
+          </a:ln>
+        </p:spPr>
+        <p:style>
+          <a:lnRef idx="2">
+            <a:schemeClr val="accent1">
+              <a:shade val="50000"/>
+            </a:schemeClr>
+          </a:lnRef>
+          <a:fillRef idx="1">
+            <a:schemeClr val="accent1"/>
+          </a:fillRef>
+          <a:effectRef idx="0">
+            <a:schemeClr val="accent1"/>
+          </a:effectRef>
+          <a:fontRef idx="minor">
+            <a:schemeClr val="lt1"/>
+          </a:fontRef>
+        </p:style>
+        <p:txBody>
+          <a:bodyPr rtlCol="0" anchor="ctr"/>
+          <a:lstStyle/>
+          <a:p>
+            <a:pPr algn="ctr"/>
+            <a:r>
+              <a:rPr lang="en-US" altLang="ko-KR" dirty="0"/>
+              <a:t>c3</a:t>
+            </a:r>
+            <a:endParaRPr lang="ko-KR" altLang="en-US" dirty="0"/>
+          </a:p>
+        </p:txBody>
+      </p:sp>
+      <p:sp>
+        <p:nvSpPr>
+          <p:cNvPr id="5" name="타원 4">
+            <a:extLst>
+              <a:ext uri="{FF2B5EF4-FFF2-40B4-BE49-F238E27FC236}">
+                <a16:creationId xmlns:a16="http://schemas.microsoft.com/office/drawing/2014/main" id="{F7EF7A48-5A0C-F165-9E8B-A47695CD5E81}"/>
+              </a:ext>
+            </a:extLst>
+          </p:cNvPr>
+          <p:cNvSpPr/>
+          <p:nvPr/>
+        </p:nvSpPr>
+        <p:spPr>
+          <a:xfrm>
+            <a:off x="9752835" y="3503428"/>
+            <a:ext cx="1392865" cy="1392865"/>
+          </a:xfrm>
+          <a:prstGeom prst="ellipse">
+            <a:avLst/>
+          </a:prstGeom>
+          <a:solidFill>
+            <a:schemeClr val="accent2"/>
+          </a:solidFill>
+          <a:ln>
+            <a:noFill/>
+          </a:ln>
+        </p:spPr>
+        <p:style>
+          <a:lnRef idx="2">
+            <a:schemeClr val="accent1">
+              <a:shade val="50000"/>
+            </a:schemeClr>
+          </a:lnRef>
+          <a:fillRef idx="1">
+            <a:schemeClr val="accent1"/>
+          </a:fillRef>
+          <a:effectRef idx="0">
+            <a:schemeClr val="accent1"/>
+          </a:effectRef>
+          <a:fontRef idx="minor">
+            <a:schemeClr val="lt1"/>
+          </a:fontRef>
+        </p:style>
+        <p:txBody>
+          <a:bodyPr rtlCol="0" anchor="ctr"/>
+          <a:lstStyle/>
+          <a:p>
+            <a:pPr algn="ctr"/>
+            <a:r>
+              <a:rPr lang="en-US" altLang="ko-KR" dirty="0"/>
+              <a:t>c4</a:t>
+            </a:r>
+            <a:endParaRPr lang="ko-KR" altLang="en-US" dirty="0"/>
+          </a:p>
+        </p:txBody>
+      </p:sp>
+      <p:cxnSp>
+        <p:nvCxnSpPr>
+          <p:cNvPr id="18" name="직선 화살표 연결선 17">
+            <a:extLst>
+              <a:ext uri="{FF2B5EF4-FFF2-40B4-BE49-F238E27FC236}">
+                <a16:creationId xmlns:a16="http://schemas.microsoft.com/office/drawing/2014/main" id="{5743BA2F-4E67-59BA-4F84-1889E6678B4C}"/>
+              </a:ext>
+            </a:extLst>
+          </p:cNvPr>
+          <p:cNvCxnSpPr>
+            <a:cxnSpLocks/>
+            <a:stCxn id="4" idx="3"/>
+          </p:cNvCxnSpPr>
+          <p:nvPr/>
+        </p:nvCxnSpPr>
+        <p:spPr>
+          <a:xfrm flipH="1">
+            <a:off x="6772679" y="3162367"/>
+            <a:ext cx="1198579" cy="1037494"/>
+          </a:xfrm>
+          <a:prstGeom prst="straightConnector1">
+            <a:avLst/>
+          </a:prstGeom>
+          <a:ln>
+            <a:solidFill>
+              <a:schemeClr val="tx1">
+                <a:lumMod val="65000"/>
+                <a:lumOff val="35000"/>
+              </a:schemeClr>
+            </a:solidFill>
+            <a:tailEnd type="triangle"/>
+          </a:ln>
+        </p:spPr>
+        <p:style>
+          <a:lnRef idx="1">
+            <a:schemeClr val="accent1"/>
+          </a:lnRef>
+          <a:fillRef idx="0">
+            <a:schemeClr val="accent1"/>
+          </a:fillRef>
+          <a:effectRef idx="0">
+            <a:schemeClr val="accent1"/>
+          </a:effectRef>
+          <a:fontRef idx="minor">
+            <a:schemeClr val="tx1"/>
+          </a:fontRef>
+        </p:style>
+      </p:cxnSp>
+      <p:cxnSp>
+        <p:nvCxnSpPr>
+          <p:cNvPr id="20" name="직선 화살표 연결선 19">
+            <a:extLst>
+              <a:ext uri="{FF2B5EF4-FFF2-40B4-BE49-F238E27FC236}">
+                <a16:creationId xmlns:a16="http://schemas.microsoft.com/office/drawing/2014/main" id="{39DB99C7-EB93-BBBB-A926-87ECF5EC8F2B}"/>
+              </a:ext>
+            </a:extLst>
+          </p:cNvPr>
+          <p:cNvCxnSpPr>
+            <a:cxnSpLocks/>
+            <a:stCxn id="5" idx="2"/>
+          </p:cNvCxnSpPr>
+          <p:nvPr/>
+        </p:nvCxnSpPr>
+        <p:spPr>
+          <a:xfrm flipH="1">
+            <a:off x="6772679" y="4199861"/>
+            <a:ext cx="2980156" cy="0"/>
+          </a:xfrm>
+          <a:prstGeom prst="straightConnector1">
+            <a:avLst/>
+          </a:prstGeom>
+          <a:ln>
+            <a:solidFill>
+              <a:schemeClr val="tx1">
+                <a:lumMod val="65000"/>
+                <a:lumOff val="35000"/>
+              </a:schemeClr>
+            </a:solidFill>
+            <a:tailEnd type="triangle"/>
+          </a:ln>
+        </p:spPr>
+        <p:style>
+          <a:lnRef idx="1">
+            <a:schemeClr val="accent1"/>
+          </a:lnRef>
+          <a:fillRef idx="0">
+            <a:schemeClr val="accent1"/>
+          </a:fillRef>
+          <a:effectRef idx="0">
+            <a:schemeClr val="accent1"/>
+          </a:effectRef>
+          <a:fontRef idx="minor">
+            <a:schemeClr val="tx1"/>
+          </a:fontRef>
+        </p:style>
+      </p:cxnSp>
+      <p:sp>
+        <p:nvSpPr>
+          <p:cNvPr id="21" name="TextBox 20">
+            <a:extLst>
+              <a:ext uri="{FF2B5EF4-FFF2-40B4-BE49-F238E27FC236}">
+                <a16:creationId xmlns:a16="http://schemas.microsoft.com/office/drawing/2014/main" id="{123B2BD2-411C-8767-527E-8C4A2177E402}"/>
+              </a:ext>
+            </a:extLst>
+          </p:cNvPr>
+          <p:cNvSpPr txBox="1"/>
+          <p:nvPr/>
+        </p:nvSpPr>
+        <p:spPr>
+          <a:xfrm>
+            <a:off x="9598075" y="2738455"/>
+            <a:ext cx="1691425" cy="369332"/>
+          </a:xfrm>
+          <a:prstGeom prst="rect">
+            <a:avLst/>
+          </a:prstGeom>
+          <a:noFill/>
+        </p:spPr>
+        <p:txBody>
+          <a:bodyPr wrap="none" rtlCol="0">
+            <a:spAutoFit/>
+          </a:bodyPr>
+          <a:lstStyle/>
+          <a:p>
+            <a:pPr algn="ctr"/>
+            <a:r>
+              <a:rPr lang="en-US" altLang="ko-KR" dirty="0"/>
+              <a:t>feature </a:t>
+            </a:r>
+            <a:r>
+              <a:rPr lang="ko-KR" altLang="en-US" dirty="0" err="1"/>
+              <a:t>브랜치</a:t>
+            </a:r>
+            <a:endParaRPr lang="ko-KR" altLang="en-US" dirty="0"/>
+          </a:p>
+        </p:txBody>
+      </p:sp>
+      <p:sp>
+        <p:nvSpPr>
+          <p:cNvPr id="22" name="TextBox 21">
+            <a:extLst>
+              <a:ext uri="{FF2B5EF4-FFF2-40B4-BE49-F238E27FC236}">
+                <a16:creationId xmlns:a16="http://schemas.microsoft.com/office/drawing/2014/main" id="{225DE9D5-DD6E-AFE0-8F68-B0A3000A744F}"/>
+              </a:ext>
+            </a:extLst>
+          </p:cNvPr>
+          <p:cNvSpPr txBox="1"/>
+          <p:nvPr/>
+        </p:nvSpPr>
+        <p:spPr>
+          <a:xfrm>
+            <a:off x="9713329" y="3058414"/>
+            <a:ext cx="1471878" cy="369332"/>
+          </a:xfrm>
+          <a:prstGeom prst="rect">
+            <a:avLst/>
+          </a:prstGeom>
+          <a:noFill/>
+        </p:spPr>
+        <p:txBody>
+          <a:bodyPr wrap="none" rtlCol="0">
+            <a:spAutoFit/>
+          </a:bodyPr>
+          <a:lstStyle/>
+          <a:p>
+            <a:pPr algn="ctr"/>
+            <a:r>
+              <a:rPr lang="en-US" altLang="ko-KR" dirty="0"/>
+              <a:t>main </a:t>
+            </a:r>
+            <a:r>
+              <a:rPr lang="ko-KR" altLang="en-US" dirty="0" err="1"/>
+              <a:t>브랜치</a:t>
             </a:r>
             <a:endParaRPr lang="ko-KR" altLang="en-US" dirty="0"/>
           </a:p>
@@ -10941,8 +11004,8 @@
         </p:nvSpPr>
         <p:spPr>
           <a:xfrm>
-            <a:off x="2495553" y="5941108"/>
-            <a:ext cx="7317324" cy="646331"/>
+            <a:off x="1673990" y="5941108"/>
+            <a:ext cx="8960466" cy="646331"/>
           </a:xfrm>
           <a:prstGeom prst="rect">
             <a:avLst/>
@@ -11050,6 +11113,543 @@
           </a:lstStyle>
           <a:p>
             <a:pPr algn="ctr"/>
+            <a:r>
+              <a:rPr lang="en-US" altLang="ko-KR" dirty="0"/>
+              <a:t>Rebase</a:t>
+            </a:r>
+            <a:r>
+              <a:rPr lang="ko-KR" altLang="en-US" dirty="0"/>
+              <a:t>의 경우는 </a:t>
+            </a:r>
+            <a:r>
+              <a:rPr lang="ko-KR" altLang="en-US" dirty="0" err="1"/>
+              <a:t>브랜치의</a:t>
+            </a:r>
+            <a:r>
+              <a:rPr lang="ko-KR" altLang="en-US" dirty="0"/>
+              <a:t> 변경사항을 순서대로 다른 </a:t>
+            </a:r>
+            <a:r>
+              <a:rPr lang="ko-KR" altLang="en-US" dirty="0" err="1"/>
+              <a:t>브랜치에</a:t>
+            </a:r>
+            <a:r>
+              <a:rPr lang="ko-KR" altLang="en-US" dirty="0"/>
+              <a:t> 적용하면서 병합하고</a:t>
+            </a:r>
+            <a:endParaRPr lang="en-US" altLang="ko-KR" dirty="0"/>
+          </a:p>
+          <a:p>
+            <a:pPr algn="ctr"/>
+            <a:r>
+              <a:rPr lang="en-US" altLang="ko-KR" dirty="0"/>
+              <a:t>Merge</a:t>
+            </a:r>
+            <a:r>
+              <a:rPr lang="ko-KR" altLang="en-US" dirty="0"/>
+              <a:t>의 경우는 두 </a:t>
+            </a:r>
+            <a:r>
+              <a:rPr lang="ko-KR" altLang="en-US" dirty="0" err="1"/>
+              <a:t>브랜치의</a:t>
+            </a:r>
+            <a:r>
+              <a:rPr lang="ko-KR" altLang="en-US" dirty="0"/>
+              <a:t> 최종결과만을 가지고 병합한다</a:t>
+            </a:r>
+            <a:r>
+              <a:rPr lang="en-US" altLang="ko-KR" dirty="0"/>
+              <a:t>.</a:t>
+            </a:r>
+          </a:p>
+        </p:txBody>
+      </p:sp>
+      <p:grpSp>
+        <p:nvGrpSpPr>
+          <p:cNvPr id="10" name="그룹 9">
+            <a:extLst>
+              <a:ext uri="{FF2B5EF4-FFF2-40B4-BE49-F238E27FC236}">
+                <a16:creationId xmlns:a16="http://schemas.microsoft.com/office/drawing/2014/main" id="{876DB19C-F578-54D0-73D8-76CA328386A2}"/>
+              </a:ext>
+            </a:extLst>
+          </p:cNvPr>
+          <p:cNvGrpSpPr/>
+          <p:nvPr/>
+        </p:nvGrpSpPr>
+        <p:grpSpPr>
+          <a:xfrm>
+            <a:off x="1234765" y="1190730"/>
+            <a:ext cx="9722471" cy="4409483"/>
+            <a:chOff x="1318876" y="1190730"/>
+            <a:chExt cx="9722471" cy="4409483"/>
+          </a:xfrm>
+        </p:grpSpPr>
+        <p:grpSp>
+          <p:nvGrpSpPr>
+            <p:cNvPr id="8" name="그룹 7">
+              <a:extLst>
+                <a:ext uri="{FF2B5EF4-FFF2-40B4-BE49-F238E27FC236}">
+                  <a16:creationId xmlns:a16="http://schemas.microsoft.com/office/drawing/2014/main" id="{E6D6F514-829A-3339-16C6-B05233DF0F63}"/>
+                </a:ext>
+              </a:extLst>
+            </p:cNvPr>
+            <p:cNvGrpSpPr/>
+            <p:nvPr/>
+          </p:nvGrpSpPr>
+          <p:grpSpPr>
+            <a:xfrm>
+              <a:off x="1318876" y="1246707"/>
+              <a:ext cx="4411403" cy="4353506"/>
+              <a:chOff x="1318876" y="1246707"/>
+              <a:chExt cx="4411403" cy="4353506"/>
+            </a:xfrm>
+          </p:grpSpPr>
+          <p:pic>
+            <p:nvPicPr>
+              <p:cNvPr id="3" name="그림 2">
+                <a:extLst>
+                  <a:ext uri="{FF2B5EF4-FFF2-40B4-BE49-F238E27FC236}">
+                    <a16:creationId xmlns:a16="http://schemas.microsoft.com/office/drawing/2014/main" id="{54D722F9-129D-4359-53F8-45CFD2E4C2D7}"/>
+                  </a:ext>
+                </a:extLst>
+              </p:cNvPr>
+              <p:cNvPicPr>
+                <a:picLocks noChangeAspect="1"/>
+              </p:cNvPicPr>
+              <p:nvPr/>
+            </p:nvPicPr>
+            <p:blipFill>
+              <a:blip r:embed="rId3"/>
+              <a:stretch>
+                <a:fillRect/>
+              </a:stretch>
+            </p:blipFill>
+            <p:spPr>
+              <a:xfrm>
+                <a:off x="1318876" y="1246707"/>
+                <a:ext cx="4411403" cy="3777469"/>
+              </a:xfrm>
+              <a:prstGeom prst="rect">
+                <a:avLst/>
+              </a:prstGeom>
+            </p:spPr>
+          </p:pic>
+          <p:sp>
+            <p:nvSpPr>
+              <p:cNvPr id="5" name="TextBox 4">
+                <a:extLst>
+                  <a:ext uri="{FF2B5EF4-FFF2-40B4-BE49-F238E27FC236}">
+                    <a16:creationId xmlns:a16="http://schemas.microsoft.com/office/drawing/2014/main" id="{E5E89C1F-98A4-7CD3-4111-FA7A5BA8DD96}"/>
+                  </a:ext>
+                </a:extLst>
+              </p:cNvPr>
+              <p:cNvSpPr txBox="1"/>
+              <p:nvPr/>
+            </p:nvSpPr>
+            <p:spPr>
+              <a:xfrm>
+                <a:off x="2936147" y="5230881"/>
+                <a:ext cx="1176861" cy="369332"/>
+              </a:xfrm>
+              <a:prstGeom prst="rect">
+                <a:avLst/>
+              </a:prstGeom>
+              <a:noFill/>
+            </p:spPr>
+            <p:txBody>
+              <a:bodyPr wrap="none" rtlCol="0">
+                <a:spAutoFit/>
+              </a:bodyPr>
+              <a:lstStyle/>
+              <a:p>
+                <a:r>
+                  <a:rPr lang="en-US" altLang="ko-KR" dirty="0"/>
+                  <a:t>&lt;merge&gt;</a:t>
+                </a:r>
+                <a:endParaRPr lang="ko-KR" altLang="en-US" dirty="0"/>
+              </a:p>
+            </p:txBody>
+          </p:sp>
+        </p:grpSp>
+        <p:grpSp>
+          <p:nvGrpSpPr>
+            <p:cNvPr id="9" name="그룹 8">
+              <a:extLst>
+                <a:ext uri="{FF2B5EF4-FFF2-40B4-BE49-F238E27FC236}">
+                  <a16:creationId xmlns:a16="http://schemas.microsoft.com/office/drawing/2014/main" id="{1B3695C7-6BBC-EE2C-8725-9BF76CFEAC91}"/>
+                </a:ext>
+              </a:extLst>
+            </p:cNvPr>
+            <p:cNvGrpSpPr/>
+            <p:nvPr/>
+          </p:nvGrpSpPr>
+          <p:grpSpPr>
+            <a:xfrm>
+              <a:off x="6304658" y="1190730"/>
+              <a:ext cx="4736689" cy="4409483"/>
+              <a:chOff x="6304658" y="1190730"/>
+              <a:chExt cx="4736689" cy="4409483"/>
+            </a:xfrm>
+          </p:grpSpPr>
+          <p:pic>
+            <p:nvPicPr>
+              <p:cNvPr id="4" name="그림 3">
+                <a:extLst>
+                  <a:ext uri="{FF2B5EF4-FFF2-40B4-BE49-F238E27FC236}">
+                    <a16:creationId xmlns:a16="http://schemas.microsoft.com/office/drawing/2014/main" id="{64F7FAB5-4601-48DF-4475-2068C4C3A9E4}"/>
+                  </a:ext>
+                </a:extLst>
+              </p:cNvPr>
+              <p:cNvPicPr>
+                <a:picLocks noChangeAspect="1"/>
+              </p:cNvPicPr>
+              <p:nvPr/>
+            </p:nvPicPr>
+            <p:blipFill>
+              <a:blip r:embed="rId4"/>
+              <a:stretch>
+                <a:fillRect/>
+              </a:stretch>
+            </p:blipFill>
+            <p:spPr>
+              <a:xfrm>
+                <a:off x="6304658" y="1190730"/>
+                <a:ext cx="4736689" cy="3833446"/>
+              </a:xfrm>
+              <a:prstGeom prst="rect">
+                <a:avLst/>
+              </a:prstGeom>
+            </p:spPr>
+          </p:pic>
+          <p:sp>
+            <p:nvSpPr>
+              <p:cNvPr id="7" name="TextBox 6">
+                <a:extLst>
+                  <a:ext uri="{FF2B5EF4-FFF2-40B4-BE49-F238E27FC236}">
+                    <a16:creationId xmlns:a16="http://schemas.microsoft.com/office/drawing/2014/main" id="{8218892F-B170-38D0-F426-46D32C04A339}"/>
+                  </a:ext>
+                </a:extLst>
+              </p:cNvPr>
+              <p:cNvSpPr txBox="1"/>
+              <p:nvPr/>
+            </p:nvSpPr>
+            <p:spPr>
+              <a:xfrm>
+                <a:off x="8078993" y="5230881"/>
+                <a:ext cx="1188018" cy="369332"/>
+              </a:xfrm>
+              <a:prstGeom prst="rect">
+                <a:avLst/>
+              </a:prstGeom>
+              <a:noFill/>
+            </p:spPr>
+            <p:txBody>
+              <a:bodyPr wrap="none" rtlCol="0">
+                <a:spAutoFit/>
+              </a:bodyPr>
+              <a:lstStyle/>
+              <a:p>
+                <a:r>
+                  <a:rPr lang="en-US" altLang="ko-KR" dirty="0"/>
+                  <a:t>&lt;rebase&gt;</a:t>
+                </a:r>
+                <a:endParaRPr lang="ko-KR" altLang="en-US" dirty="0"/>
+              </a:p>
+            </p:txBody>
+          </p:sp>
+        </p:grpSp>
+      </p:grpSp>
+    </p:spTree>
+    <p:extLst>
+      <p:ext uri="{BB962C8B-B14F-4D97-AF65-F5344CB8AC3E}">
+        <p14:creationId xmlns:p14="http://schemas.microsoft.com/office/powerpoint/2010/main" val="912596379"/>
+      </p:ext>
+    </p:extLst>
+  </p:cSld>
+  <p:clrMapOvr>
+    <a:masterClrMapping/>
+  </p:clrMapOvr>
+</p:sld>
+</file>
+
+<file path=ppt/slides/slide2.xml><?xml version="1.0" encoding="utf-8"?>
+<p:sld xmlns:a="http://schemas.openxmlformats.org/drawingml/2006/main" xmlns:r="http://schemas.openxmlformats.org/officeDocument/2006/relationships" xmlns:p="http://schemas.openxmlformats.org/presentationml/2006/main">
+  <p:cSld>
+    <p:spTree>
+      <p:nvGrpSpPr>
+        <p:cNvPr id="1" name=""/>
+        <p:cNvGrpSpPr/>
+        <p:nvPr/>
+      </p:nvGrpSpPr>
+      <p:grpSpPr>
+        <a:xfrm>
+          <a:off x="0" y="0"/>
+          <a:ext cx="0" cy="0"/>
+          <a:chOff x="0" y="0"/>
+          <a:chExt cx="0" cy="0"/>
+        </a:xfrm>
+      </p:grpSpPr>
+      <p:sp>
+        <p:nvSpPr>
+          <p:cNvPr id="4" name="TextBox 3">
+            <a:extLst>
+              <a:ext uri="{FF2B5EF4-FFF2-40B4-BE49-F238E27FC236}">
+                <a16:creationId xmlns:a16="http://schemas.microsoft.com/office/drawing/2014/main" id="{253AFF4E-34A2-EBC4-9671-C2D5DEBA9D07}"/>
+              </a:ext>
+            </a:extLst>
+          </p:cNvPr>
+          <p:cNvSpPr txBox="1"/>
+          <p:nvPr/>
+        </p:nvSpPr>
+        <p:spPr>
+          <a:xfrm>
+            <a:off x="1674784" y="3105835"/>
+            <a:ext cx="8842485" cy="646331"/>
+          </a:xfrm>
+          <a:prstGeom prst="rect">
+            <a:avLst/>
+          </a:prstGeom>
+          <a:noFill/>
+        </p:spPr>
+        <p:txBody>
+          <a:bodyPr wrap="none" rtlCol="0" anchor="ctr">
+            <a:spAutoFit/>
+          </a:bodyPr>
+          <a:lstStyle/>
+          <a:p>
+            <a:pPr algn="ctr"/>
+            <a:r>
+              <a:rPr lang="ko-KR" altLang="en-US" sz="3600" dirty="0"/>
+              <a:t>한 </a:t>
+            </a:r>
+            <a:r>
+              <a:rPr lang="ko-KR" altLang="en-US" sz="3600" dirty="0" err="1"/>
+              <a:t>브랜치에서</a:t>
+            </a:r>
+            <a:r>
+              <a:rPr lang="ko-KR" altLang="en-US" sz="3600" dirty="0"/>
+              <a:t> 다른 </a:t>
+            </a:r>
+            <a:r>
+              <a:rPr lang="ko-KR" altLang="en-US" sz="3600" dirty="0" err="1"/>
+              <a:t>브랜치로</a:t>
+            </a:r>
+            <a:r>
+              <a:rPr lang="ko-KR" altLang="en-US" sz="3600" dirty="0"/>
+              <a:t> 합치는 방법</a:t>
+            </a:r>
+          </a:p>
+        </p:txBody>
+      </p:sp>
+    </p:spTree>
+    <p:extLst>
+      <p:ext uri="{BB962C8B-B14F-4D97-AF65-F5344CB8AC3E}">
+        <p14:creationId xmlns:p14="http://schemas.microsoft.com/office/powerpoint/2010/main" val="3027621592"/>
+      </p:ext>
+    </p:extLst>
+  </p:cSld>
+  <p:clrMapOvr>
+    <a:masterClrMapping/>
+  </p:clrMapOvr>
+</p:sld>
+</file>
+
+<file path=ppt/slides/slide20.xml><?xml version="1.0" encoding="utf-8"?>
+<p:sld xmlns:a="http://schemas.openxmlformats.org/drawingml/2006/main" xmlns:r="http://schemas.openxmlformats.org/officeDocument/2006/relationships" xmlns:p="http://schemas.openxmlformats.org/presentationml/2006/main">
+  <p:cSld>
+    <p:spTree>
+      <p:nvGrpSpPr>
+        <p:cNvPr id="1" name=""/>
+        <p:cNvGrpSpPr/>
+        <p:nvPr/>
+      </p:nvGrpSpPr>
+      <p:grpSpPr>
+        <a:xfrm>
+          <a:off x="0" y="0"/>
+          <a:ext cx="0" cy="0"/>
+          <a:chOff x="0" y="0"/>
+          <a:chExt cx="0" cy="0"/>
+        </a:xfrm>
+      </p:grpSpPr>
+      <p:sp>
+        <p:nvSpPr>
+          <p:cNvPr id="2" name="TextBox 1">
+            <a:extLst>
+              <a:ext uri="{FF2B5EF4-FFF2-40B4-BE49-F238E27FC236}">
+                <a16:creationId xmlns:a16="http://schemas.microsoft.com/office/drawing/2014/main" id="{2A1CB3E1-0179-A769-9EB1-1D24BD0F0746}"/>
+              </a:ext>
+            </a:extLst>
+          </p:cNvPr>
+          <p:cNvSpPr txBox="1"/>
+          <p:nvPr/>
+        </p:nvSpPr>
+        <p:spPr>
+          <a:xfrm>
+            <a:off x="3714532" y="270561"/>
+            <a:ext cx="4762971" cy="584775"/>
+          </a:xfrm>
+          <a:prstGeom prst="rect">
+            <a:avLst/>
+          </a:prstGeom>
+          <a:noFill/>
+        </p:spPr>
+        <p:txBody>
+          <a:bodyPr wrap="none" rtlCol="0" anchor="ctr">
+            <a:spAutoFit/>
+          </a:bodyPr>
+          <a:lstStyle/>
+          <a:p>
+            <a:pPr algn="ctr"/>
+            <a:r>
+              <a:rPr lang="en-US" altLang="ko-KR" sz="3200" dirty="0"/>
+              <a:t>[merge</a:t>
+            </a:r>
+            <a:r>
+              <a:rPr lang="ko-KR" altLang="en-US" sz="3200" dirty="0"/>
+              <a:t>와 </a:t>
+            </a:r>
+            <a:r>
+              <a:rPr lang="en-US" altLang="ko-KR" sz="3200" dirty="0"/>
+              <a:t>rebase</a:t>
+            </a:r>
+            <a:r>
+              <a:rPr lang="ko-KR" altLang="en-US" sz="3200" dirty="0"/>
+              <a:t> 차이점</a:t>
+            </a:r>
+            <a:r>
+              <a:rPr lang="en-US" altLang="ko-KR" sz="3200" dirty="0"/>
+              <a:t>]</a:t>
+            </a:r>
+          </a:p>
+        </p:txBody>
+      </p:sp>
+      <p:sp>
+        <p:nvSpPr>
+          <p:cNvPr id="25" name="TextBox 2">
+            <a:extLst>
+              <a:ext uri="{FF2B5EF4-FFF2-40B4-BE49-F238E27FC236}">
+                <a16:creationId xmlns:a16="http://schemas.microsoft.com/office/drawing/2014/main" id="{D8F379D6-3DF8-03F5-07C0-F206CA3BBEE8}"/>
+              </a:ext>
+            </a:extLst>
+          </p:cNvPr>
+          <p:cNvSpPr txBox="1"/>
+          <p:nvPr/>
+        </p:nvSpPr>
+        <p:spPr>
+          <a:xfrm>
+            <a:off x="2050214" y="5941108"/>
+            <a:ext cx="8091574" cy="646331"/>
+          </a:xfrm>
+          <a:prstGeom prst="rect">
+            <a:avLst/>
+          </a:prstGeom>
+          <a:noFill/>
+        </p:spPr>
+        <p:txBody>
+          <a:bodyPr wrap="none" rtlCol="0">
+            <a:spAutoFit/>
+          </a:bodyPr>
+          <a:lstStyle>
+            <a:defPPr>
+              <a:defRPr lang="ko-KR"/>
+            </a:defPPr>
+            <a:lvl1pPr marL="0" algn="l" defTabSz="914400" rtl="0" eaLnBrk="1" latinLnBrk="1" hangingPunct="1">
+              <a:defRPr sz="1800" kern="1200">
+                <a:solidFill>
+                  <a:schemeClr val="tx1"/>
+                </a:solidFill>
+                <a:latin typeface="+mn-lt"/>
+                <a:ea typeface="+mn-ea"/>
+                <a:cs typeface="+mn-cs"/>
+              </a:defRPr>
+            </a:lvl1pPr>
+            <a:lvl2pPr marL="457200" algn="l" defTabSz="914400" rtl="0" eaLnBrk="1" latinLnBrk="1" hangingPunct="1">
+              <a:defRPr sz="1800" kern="1200">
+                <a:solidFill>
+                  <a:schemeClr val="tx1"/>
+                </a:solidFill>
+                <a:latin typeface="+mn-lt"/>
+                <a:ea typeface="+mn-ea"/>
+                <a:cs typeface="+mn-cs"/>
+              </a:defRPr>
+            </a:lvl2pPr>
+            <a:lvl3pPr marL="914400" algn="l" defTabSz="914400" rtl="0" eaLnBrk="1" latinLnBrk="1" hangingPunct="1">
+              <a:defRPr sz="1800" kern="1200">
+                <a:solidFill>
+                  <a:schemeClr val="tx1"/>
+                </a:solidFill>
+                <a:latin typeface="+mn-lt"/>
+                <a:ea typeface="+mn-ea"/>
+                <a:cs typeface="+mn-cs"/>
+              </a:defRPr>
+            </a:lvl3pPr>
+            <a:lvl4pPr marL="1371600" algn="l" defTabSz="914400" rtl="0" eaLnBrk="1" latinLnBrk="1" hangingPunct="1">
+              <a:defRPr sz="1800" kern="1200">
+                <a:solidFill>
+                  <a:schemeClr val="tx1"/>
+                </a:solidFill>
+                <a:latin typeface="+mn-lt"/>
+                <a:ea typeface="+mn-ea"/>
+                <a:cs typeface="+mn-cs"/>
+              </a:defRPr>
+            </a:lvl4pPr>
+            <a:lvl5pPr marL="1828800" algn="l" defTabSz="914400" rtl="0" eaLnBrk="1" latinLnBrk="1" hangingPunct="1">
+              <a:defRPr sz="1800" kern="1200">
+                <a:solidFill>
+                  <a:schemeClr val="tx1"/>
+                </a:solidFill>
+                <a:latin typeface="+mn-lt"/>
+                <a:ea typeface="+mn-ea"/>
+                <a:cs typeface="+mn-cs"/>
+              </a:defRPr>
+            </a:lvl5pPr>
+            <a:lvl6pPr marL="2286000" algn="l" defTabSz="914400" rtl="0" eaLnBrk="1" latinLnBrk="1" hangingPunct="1">
+              <a:defRPr sz="1800" kern="1200">
+                <a:solidFill>
+                  <a:schemeClr val="tx1"/>
+                </a:solidFill>
+                <a:latin typeface="+mn-lt"/>
+                <a:ea typeface="+mn-ea"/>
+                <a:cs typeface="+mn-cs"/>
+              </a:defRPr>
+            </a:lvl6pPr>
+            <a:lvl7pPr marL="2743200" algn="l" defTabSz="914400" rtl="0" eaLnBrk="1" latinLnBrk="1" hangingPunct="1">
+              <a:defRPr sz="1800" kern="1200">
+                <a:solidFill>
+                  <a:schemeClr val="tx1"/>
+                </a:solidFill>
+                <a:latin typeface="+mn-lt"/>
+                <a:ea typeface="+mn-ea"/>
+                <a:cs typeface="+mn-cs"/>
+              </a:defRPr>
+            </a:lvl7pPr>
+            <a:lvl8pPr marL="3200400" algn="l" defTabSz="914400" rtl="0" eaLnBrk="1" latinLnBrk="1" hangingPunct="1">
+              <a:defRPr sz="1800" kern="1200">
+                <a:solidFill>
+                  <a:schemeClr val="tx1"/>
+                </a:solidFill>
+                <a:latin typeface="+mn-lt"/>
+                <a:ea typeface="+mn-ea"/>
+                <a:cs typeface="+mn-cs"/>
+              </a:defRPr>
+            </a:lvl8pPr>
+            <a:lvl9pPr marL="3657600" algn="l" defTabSz="914400" rtl="0" eaLnBrk="1" latinLnBrk="1" hangingPunct="1">
+              <a:defRPr sz="1800" kern="1200">
+                <a:solidFill>
+                  <a:schemeClr val="tx1"/>
+                </a:solidFill>
+                <a:latin typeface="+mn-lt"/>
+                <a:ea typeface="+mn-ea"/>
+                <a:cs typeface="+mn-cs"/>
+              </a:defRPr>
+            </a:lvl9pPr>
+          </a:lstStyle>
+          <a:p>
+            <a:pPr algn="ctr"/>
+            <a:r>
+              <a:rPr lang="ko-KR" altLang="en-US" dirty="0"/>
+              <a:t>따라서 </a:t>
+            </a:r>
             <a:r>
               <a:rPr lang="en-US" altLang="ko-KR" dirty="0"/>
               <a:t>Rebase</a:t>
@@ -11296,7 +11896,7 @@
 </p:sld>
 </file>
 
-<file path=ppt/slides/slide2.xml><?xml version="1.0" encoding="utf-8"?>
+<file path=ppt/slides/slide21.xml><?xml version="1.0" encoding="utf-8"?>
 <p:sld xmlns:a="http://schemas.openxmlformats.org/drawingml/2006/main" xmlns:r="http://schemas.openxmlformats.org/officeDocument/2006/relationships" xmlns:p="http://schemas.openxmlformats.org/presentationml/2006/main">
   <p:cSld>
     <p:spTree>
@@ -11327,8 +11927,8 @@
         </p:nvSpPr>
         <p:spPr>
           <a:xfrm>
-            <a:off x="1674784" y="3105835"/>
-            <a:ext cx="8842485" cy="646331"/>
+            <a:off x="4318265" y="3105835"/>
+            <a:ext cx="3555525" cy="646331"/>
           </a:xfrm>
           <a:prstGeom prst="rect">
             <a:avLst/>
@@ -11343,24 +11943,12 @@
           <a:p>
             <a:pPr algn="ctr"/>
             <a:r>
+              <a:rPr lang="en-US" altLang="ko-KR" sz="3600" dirty="0"/>
+              <a:t>rebase</a:t>
+            </a:r>
+            <a:r>
               <a:rPr lang="ko-KR" altLang="en-US" sz="3600" dirty="0"/>
-              <a:t>한 </a:t>
-            </a:r>
-            <a:r>
-              <a:rPr lang="ko-KR" altLang="en-US" sz="3600" dirty="0" err="1"/>
-              <a:t>브랜치에서</a:t>
-            </a:r>
-            <a:r>
-              <a:rPr lang="ko-KR" altLang="en-US" sz="3600" dirty="0"/>
-              <a:t> 다른 </a:t>
-            </a:r>
-            <a:r>
-              <a:rPr lang="ko-KR" altLang="en-US" sz="3600" dirty="0" err="1"/>
-              <a:t>브랜치로</a:t>
-            </a:r>
-            <a:r>
-              <a:rPr lang="ko-KR" altLang="en-US" sz="3600" dirty="0"/>
-              <a:t> 합치는 방법</a:t>
+              <a:t>의 위험성</a:t>
             </a:r>
           </a:p>
         </p:txBody>
@@ -11368,7 +11956,7 @@
     </p:spTree>
     <p:extLst>
       <p:ext uri="{BB962C8B-B14F-4D97-AF65-F5344CB8AC3E}">
-        <p14:creationId xmlns:p14="http://schemas.microsoft.com/office/powerpoint/2010/main" val="3027621592"/>
+        <p14:creationId xmlns:p14="http://schemas.microsoft.com/office/powerpoint/2010/main" val="1062624680"/>
       </p:ext>
     </p:extLst>
   </p:cSld>
@@ -11378,7 +11966,7 @@
 </p:sld>
 </file>
 
-<file path=ppt/slides/slide20.xml><?xml version="1.0" encoding="utf-8"?>
+<file path=ppt/slides/slide22.xml><?xml version="1.0" encoding="utf-8"?>
 <p:sld xmlns:a="http://schemas.openxmlformats.org/drawingml/2006/main" xmlns:r="http://schemas.openxmlformats.org/officeDocument/2006/relationships" xmlns:p="http://schemas.openxmlformats.org/presentationml/2006/main">
   <p:cSld>
     <p:spTree>
@@ -12031,7 +12619,7 @@
 </p:sld>
 </file>
 
-<file path=ppt/slides/slide21.xml><?xml version="1.0" encoding="utf-8"?>
+<file path=ppt/slides/slide23.xml><?xml version="1.0" encoding="utf-8"?>
 <p:sld xmlns:a="http://schemas.openxmlformats.org/drawingml/2006/main" xmlns:r="http://schemas.openxmlformats.org/officeDocument/2006/relationships" xmlns:p="http://schemas.openxmlformats.org/presentationml/2006/main">
   <p:cSld>
     <p:spTree>
@@ -12326,27 +12914,27 @@
           <a:p>
             <a:pPr algn="ctr"/>
             <a:r>
-              <a:rPr lang="ko-KR" altLang="en-US" dirty="0"/>
+              <a:rPr lang="ko-KR" altLang="en-US" b="1" dirty="0"/>
               <a:t>하나는 </a:t>
             </a:r>
             <a:r>
-              <a:rPr lang="en-US" altLang="ko-KR" dirty="0"/>
+              <a:rPr lang="en-US" altLang="ko-KR" b="1" dirty="0"/>
               <a:t>merge</a:t>
             </a:r>
             <a:r>
-              <a:rPr lang="ko-KR" altLang="en-US" dirty="0"/>
+              <a:rPr lang="ko-KR" altLang="en-US" b="1" dirty="0"/>
               <a:t>이고 다른 하나는 </a:t>
             </a:r>
             <a:r>
-              <a:rPr lang="en-US" altLang="ko-KR" dirty="0"/>
+              <a:rPr lang="en-US" altLang="ko-KR" b="1" dirty="0"/>
               <a:t>rebase</a:t>
             </a:r>
             <a:r>
-              <a:rPr lang="ko-KR" altLang="en-US" dirty="0"/>
+              <a:rPr lang="ko-KR" altLang="en-US" b="1" dirty="0"/>
               <a:t>다</a:t>
             </a:r>
             <a:r>
-              <a:rPr lang="en-US" altLang="ko-KR" dirty="0"/>
+              <a:rPr lang="en-US" altLang="ko-KR" b="1" dirty="0"/>
               <a:t>.</a:t>
             </a:r>
             <a:endParaRPr lang="en-US" altLang="ko-KR" b="1" dirty="0">
@@ -14314,6 +14902,58 @@
           </a:prstGeom>
         </p:spPr>
       </p:pic>
+      <p:sp>
+        <p:nvSpPr>
+          <p:cNvPr id="4" name="직사각형 3">
+            <a:extLst>
+              <a:ext uri="{FF2B5EF4-FFF2-40B4-BE49-F238E27FC236}">
+                <a16:creationId xmlns:a16="http://schemas.microsoft.com/office/drawing/2014/main" id="{CFCFE0FB-E5E4-63F8-0301-49684FDDA170}"/>
+              </a:ext>
+            </a:extLst>
+          </p:cNvPr>
+          <p:cNvSpPr/>
+          <p:nvPr/>
+        </p:nvSpPr>
+        <p:spPr>
+          <a:xfrm>
+            <a:off x="3568223" y="2839453"/>
+            <a:ext cx="5128890" cy="1780673"/>
+          </a:xfrm>
+          <a:prstGeom prst="rect">
+            <a:avLst/>
+          </a:prstGeom>
+          <a:noFill/>
+          <a:ln w="38100">
+            <a:solidFill>
+              <a:srgbClr val="FF0000"/>
+            </a:solidFill>
+          </a:ln>
+        </p:spPr>
+        <p:style>
+          <a:lnRef idx="2">
+            <a:schemeClr val="accent1">
+              <a:shade val="50000"/>
+            </a:schemeClr>
+          </a:lnRef>
+          <a:fillRef idx="1">
+            <a:schemeClr val="accent1"/>
+          </a:fillRef>
+          <a:effectRef idx="0">
+            <a:schemeClr val="accent1"/>
+          </a:effectRef>
+          <a:fontRef idx="minor">
+            <a:schemeClr val="lt1"/>
+          </a:fontRef>
+        </p:style>
+        <p:txBody>
+          <a:bodyPr rtlCol="0" anchor="ctr"/>
+          <a:lstStyle/>
+          <a:p>
+            <a:pPr algn="ctr"/>
+            <a:endParaRPr lang="ko-KR" altLang="en-US"/>
+          </a:p>
+        </p:txBody>
+      </p:sp>
     </p:spTree>
     <p:extLst>
       <p:ext uri="{BB962C8B-B14F-4D97-AF65-F5344CB8AC3E}">

</xml_diff>